<commit_message>
updating work flow not final, outline changes implemented
</commit_message>
<xml_diff>
--- a/resources/DataProcessingDocumentation.pptx
+++ b/resources/DataProcessingDocumentation.pptx
@@ -5,19 +5,20 @@
     <p:sldMasterId id="2147483648" r:id="rId1"/>
   </p:sldMasterIdLst>
   <p:notesMasterIdLst>
-    <p:notesMasterId r:id="rId12"/>
+    <p:notesMasterId r:id="rId13"/>
   </p:notesMasterIdLst>
   <p:sldIdLst>
     <p:sldId id="280" r:id="rId2"/>
-    <p:sldId id="279" r:id="rId3"/>
-    <p:sldId id="281" r:id="rId4"/>
-    <p:sldId id="282" r:id="rId5"/>
-    <p:sldId id="263" r:id="rId6"/>
-    <p:sldId id="260" r:id="rId7"/>
-    <p:sldId id="283" r:id="rId8"/>
-    <p:sldId id="259" r:id="rId9"/>
-    <p:sldId id="262" r:id="rId10"/>
-    <p:sldId id="264" r:id="rId11"/>
+    <p:sldId id="284" r:id="rId3"/>
+    <p:sldId id="279" r:id="rId4"/>
+    <p:sldId id="281" r:id="rId5"/>
+    <p:sldId id="282" r:id="rId6"/>
+    <p:sldId id="263" r:id="rId7"/>
+    <p:sldId id="260" r:id="rId8"/>
+    <p:sldId id="283" r:id="rId9"/>
+    <p:sldId id="259" r:id="rId10"/>
+    <p:sldId id="262" r:id="rId11"/>
+    <p:sldId id="264" r:id="rId12"/>
   </p:sldIdLst>
   <p:sldSz cx="12192000" cy="6858000"/>
   <p:notesSz cx="6858000" cy="9144000"/>
@@ -122,6 +123,7 @@
         <p14:section name="Processing Map" id="{6AEDD277-94D0-4E6A-9ADE-1A0C229C46E2}">
           <p14:sldIdLst>
             <p14:sldId id="280"/>
+            <p14:sldId id="284"/>
             <p14:sldId id="279"/>
             <p14:sldId id="281"/>
             <p14:sldId id="282"/>
@@ -228,7 +230,7 @@
           <a:p>
             <a:fld id="{A0EDB7BB-2F45-498B-BAA5-C7C8A1082E91}" type="datetimeFigureOut">
               <a:rPr lang="en-US" smtClean="0"/>
-              <a:t>10/17/2025</a:t>
+              <a:t>10/18/2025</a:t>
             </a:fld>
             <a:endParaRPr lang="en-US"/>
           </a:p>
@@ -666,7 +668,7 @@
           <a:p>
             <a:fld id="{4F6C63A1-8B87-45C1-87E6-F4D0F1330E39}" type="slidenum">
               <a:rPr lang="en-US" smtClean="0"/>
-              <a:t>2</a:t>
+              <a:t>3</a:t>
             </a:fld>
             <a:endParaRPr lang="en-US"/>
           </a:p>
@@ -793,7 +795,7 @@
           <a:p>
             <a:fld id="{4F6C63A1-8B87-45C1-87E6-F4D0F1330E39}" type="slidenum">
               <a:rPr lang="en-US" smtClean="0"/>
-              <a:t>3</a:t>
+              <a:t>4</a:t>
             </a:fld>
             <a:endParaRPr lang="en-US"/>
           </a:p>
@@ -920,7 +922,7 @@
           <a:p>
             <a:fld id="{4F6C63A1-8B87-45C1-87E6-F4D0F1330E39}" type="slidenum">
               <a:rPr lang="en-US" smtClean="0"/>
-              <a:t>4</a:t>
+              <a:t>5</a:t>
             </a:fld>
             <a:endParaRPr lang="en-US"/>
           </a:p>
@@ -1086,7 +1088,7 @@
           <a:p>
             <a:fld id="{1B31CA29-C2EB-451B-A0BB-9B4644E6EA20}" type="datetimeFigureOut">
               <a:rPr lang="en-US" smtClean="0"/>
-              <a:t>10/17/2025</a:t>
+              <a:t>10/18/2025</a:t>
             </a:fld>
             <a:endParaRPr lang="en-US"/>
           </a:p>
@@ -1284,7 +1286,7 @@
           <a:p>
             <a:fld id="{1B31CA29-C2EB-451B-A0BB-9B4644E6EA20}" type="datetimeFigureOut">
               <a:rPr lang="en-US" smtClean="0"/>
-              <a:t>10/17/2025</a:t>
+              <a:t>10/18/2025</a:t>
             </a:fld>
             <a:endParaRPr lang="en-US"/>
           </a:p>
@@ -1492,7 +1494,7 @@
           <a:p>
             <a:fld id="{1B31CA29-C2EB-451B-A0BB-9B4644E6EA20}" type="datetimeFigureOut">
               <a:rPr lang="en-US" smtClean="0"/>
-              <a:t>10/17/2025</a:t>
+              <a:t>10/18/2025</a:t>
             </a:fld>
             <a:endParaRPr lang="en-US"/>
           </a:p>
@@ -1690,7 +1692,7 @@
           <a:p>
             <a:fld id="{1B31CA29-C2EB-451B-A0BB-9B4644E6EA20}" type="datetimeFigureOut">
               <a:rPr lang="en-US" smtClean="0"/>
-              <a:t>10/17/2025</a:t>
+              <a:t>10/18/2025</a:t>
             </a:fld>
             <a:endParaRPr lang="en-US"/>
           </a:p>
@@ -1965,7 +1967,7 @@
           <a:p>
             <a:fld id="{1B31CA29-C2EB-451B-A0BB-9B4644E6EA20}" type="datetimeFigureOut">
               <a:rPr lang="en-US" smtClean="0"/>
-              <a:t>10/17/2025</a:t>
+              <a:t>10/18/2025</a:t>
             </a:fld>
             <a:endParaRPr lang="en-US"/>
           </a:p>
@@ -2230,7 +2232,7 @@
           <a:p>
             <a:fld id="{1B31CA29-C2EB-451B-A0BB-9B4644E6EA20}" type="datetimeFigureOut">
               <a:rPr lang="en-US" smtClean="0"/>
-              <a:t>10/17/2025</a:t>
+              <a:t>10/18/2025</a:t>
             </a:fld>
             <a:endParaRPr lang="en-US"/>
           </a:p>
@@ -2642,7 +2644,7 @@
           <a:p>
             <a:fld id="{1B31CA29-C2EB-451B-A0BB-9B4644E6EA20}" type="datetimeFigureOut">
               <a:rPr lang="en-US" smtClean="0"/>
-              <a:t>10/17/2025</a:t>
+              <a:t>10/18/2025</a:t>
             </a:fld>
             <a:endParaRPr lang="en-US"/>
           </a:p>
@@ -2783,7 +2785,7 @@
           <a:p>
             <a:fld id="{1B31CA29-C2EB-451B-A0BB-9B4644E6EA20}" type="datetimeFigureOut">
               <a:rPr lang="en-US" smtClean="0"/>
-              <a:t>10/17/2025</a:t>
+              <a:t>10/18/2025</a:t>
             </a:fld>
             <a:endParaRPr lang="en-US"/>
           </a:p>
@@ -2896,7 +2898,7 @@
           <a:p>
             <a:fld id="{1B31CA29-C2EB-451B-A0BB-9B4644E6EA20}" type="datetimeFigureOut">
               <a:rPr lang="en-US" smtClean="0"/>
-              <a:t>10/17/2025</a:t>
+              <a:t>10/18/2025</a:t>
             </a:fld>
             <a:endParaRPr lang="en-US"/>
           </a:p>
@@ -3207,7 +3209,7 @@
           <a:p>
             <a:fld id="{1B31CA29-C2EB-451B-A0BB-9B4644E6EA20}" type="datetimeFigureOut">
               <a:rPr lang="en-US" smtClean="0"/>
-              <a:t>10/17/2025</a:t>
+              <a:t>10/18/2025</a:t>
             </a:fld>
             <a:endParaRPr lang="en-US"/>
           </a:p>
@@ -3495,7 +3497,7 @@
           <a:p>
             <a:fld id="{1B31CA29-C2EB-451B-A0BB-9B4644E6EA20}" type="datetimeFigureOut">
               <a:rPr lang="en-US" smtClean="0"/>
-              <a:t>10/17/2025</a:t>
+              <a:t>10/18/2025</a:t>
             </a:fld>
             <a:endParaRPr lang="en-US"/>
           </a:p>
@@ -3736,7 +3738,7 @@
           <a:p>
             <a:fld id="{1B31CA29-C2EB-451B-A0BB-9B4644E6EA20}" type="datetimeFigureOut">
               <a:rPr lang="en-US" smtClean="0"/>
-              <a:t>10/17/2025</a:t>
+              <a:t>10/18/2025</a:t>
             </a:fld>
             <a:endParaRPr lang="en-US"/>
           </a:p>
@@ -4349,7 +4351,7 @@
         <p:cNvPr id="1" name="">
           <a:extLst>
             <a:ext uri="{FF2B5EF4-FFF2-40B4-BE49-F238E27FC236}">
-              <a16:creationId xmlns:a16="http://schemas.microsoft.com/office/drawing/2014/main" id="{4B23D998-895C-626D-F349-6BE98BFD3D0D}"/>
+              <a16:creationId xmlns:a16="http://schemas.microsoft.com/office/drawing/2014/main" id="{B4095AB1-CD7A-1FCC-3056-D158420871B2}"/>
             </a:ext>
           </a:extLst>
         </p:cNvPr>
@@ -4369,7 +4371,7 @@
           <p:cNvPr id="9" name="Rectangle 8">
             <a:extLst>
               <a:ext uri="{FF2B5EF4-FFF2-40B4-BE49-F238E27FC236}">
-                <a16:creationId xmlns:a16="http://schemas.microsoft.com/office/drawing/2014/main" id="{1FD3CCE0-0C1F-7256-4E90-7437083F03C8}"/>
+                <a16:creationId xmlns:a16="http://schemas.microsoft.com/office/drawing/2014/main" id="{C935488D-FA67-3C31-5851-38267BE1CA56}"/>
               </a:ext>
             </a:extLst>
           </p:cNvPr>
@@ -4415,7 +4417,7 @@
           <p:cNvPr id="4" name="Rectangle 3">
             <a:extLst>
               <a:ext uri="{FF2B5EF4-FFF2-40B4-BE49-F238E27FC236}">
-                <a16:creationId xmlns:a16="http://schemas.microsoft.com/office/drawing/2014/main" id="{7504C15E-096D-3903-5184-6B0874FAE232}"/>
+                <a16:creationId xmlns:a16="http://schemas.microsoft.com/office/drawing/2014/main" id="{EFCC18C3-C828-88CA-2ADE-F21B0848FB42}"/>
               </a:ext>
             </a:extLst>
           </p:cNvPr>
@@ -4461,7 +4463,7 @@
           <p:cNvPr id="2" name="Table 1">
             <a:extLst>
               <a:ext uri="{FF2B5EF4-FFF2-40B4-BE49-F238E27FC236}">
-                <a16:creationId xmlns:a16="http://schemas.microsoft.com/office/drawing/2014/main" id="{5AB35D03-E502-08F3-9864-A96D82175423}"/>
+                <a16:creationId xmlns:a16="http://schemas.microsoft.com/office/drawing/2014/main" id="{88A41462-D606-07E0-F1D3-783C265B7E3C}"/>
               </a:ext>
             </a:extLst>
           </p:cNvPr>
@@ -4688,6 +4690,1167 @@
           <p:cNvPr id="3" name="TextBox 2">
             <a:extLst>
               <a:ext uri="{FF2B5EF4-FFF2-40B4-BE49-F238E27FC236}">
+                <a16:creationId xmlns:a16="http://schemas.microsoft.com/office/drawing/2014/main" id="{CBBEE4C1-ED4B-C4C9-2A77-94427C97BBAF}"/>
+              </a:ext>
+            </a:extLst>
+          </p:cNvPr>
+          <p:cNvSpPr txBox="1"/>
+          <p:nvPr/>
+        </p:nvSpPr>
+        <p:spPr>
+          <a:xfrm>
+            <a:off x="119974" y="1230971"/>
+            <a:ext cx="1438792" cy="923330"/>
+          </a:xfrm>
+          <a:prstGeom prst="rect">
+            <a:avLst/>
+          </a:prstGeom>
+          <a:noFill/>
+        </p:spPr>
+        <p:txBody>
+          <a:bodyPr wrap="none" rtlCol="0">
+            <a:spAutoFit/>
+          </a:bodyPr>
+          <a:lstStyle/>
+          <a:p>
+            <a:pPr algn="ctr"/>
+            <a:r>
+              <a:rPr lang="en-US" dirty="0"/>
+              <a:t>Event </a:t>
+            </a:r>
+          </a:p>
+          <a:p>
+            <a:pPr algn="ctr"/>
+            <a:r>
+              <a:rPr lang="en-US" dirty="0"/>
+              <a:t>Data</a:t>
+            </a:r>
+          </a:p>
+          <a:p>
+            <a:pPr algn="ctr"/>
+            <a:r>
+              <a:rPr lang="en-US" dirty="0"/>
+              <a:t>(last 5 years)</a:t>
+            </a:r>
+          </a:p>
+        </p:txBody>
+      </p:sp>
+      <p:sp>
+        <p:nvSpPr>
+          <p:cNvPr id="5" name="TextBox 4">
+            <a:extLst>
+              <a:ext uri="{FF2B5EF4-FFF2-40B4-BE49-F238E27FC236}">
+                <a16:creationId xmlns:a16="http://schemas.microsoft.com/office/drawing/2014/main" id="{2F692F79-9CBB-EADB-DBED-E9437853B071}"/>
+              </a:ext>
+            </a:extLst>
+          </p:cNvPr>
+          <p:cNvSpPr txBox="1"/>
+          <p:nvPr/>
+        </p:nvSpPr>
+        <p:spPr>
+          <a:xfrm>
+            <a:off x="4708187" y="312376"/>
+            <a:ext cx="2332433" cy="369332"/>
+          </a:xfrm>
+          <a:prstGeom prst="rect">
+            <a:avLst/>
+          </a:prstGeom>
+          <a:noFill/>
+        </p:spPr>
+        <p:txBody>
+          <a:bodyPr wrap="none" rtlCol="0">
+            <a:spAutoFit/>
+          </a:bodyPr>
+          <a:lstStyle/>
+          <a:p>
+            <a:r>
+              <a:rPr lang="en-US" dirty="0"/>
+              <a:t>Dairy Data Base Files </a:t>
+            </a:r>
+          </a:p>
+        </p:txBody>
+      </p:sp>
+      <p:sp>
+        <p:nvSpPr>
+          <p:cNvPr id="7" name="Oval 6">
+            <a:extLst>
+              <a:ext uri="{FF2B5EF4-FFF2-40B4-BE49-F238E27FC236}">
+                <a16:creationId xmlns:a16="http://schemas.microsoft.com/office/drawing/2014/main" id="{C2D1376C-06D6-2B6B-4DFD-1FA61552DED7}"/>
+              </a:ext>
+            </a:extLst>
+          </p:cNvPr>
+          <p:cNvSpPr/>
+          <p:nvPr/>
+        </p:nvSpPr>
+        <p:spPr>
+          <a:xfrm>
+            <a:off x="410903" y="3058097"/>
+            <a:ext cx="2021013" cy="744373"/>
+          </a:xfrm>
+          <a:prstGeom prst="ellipse">
+            <a:avLst/>
+          </a:prstGeom>
+          <a:solidFill>
+            <a:schemeClr val="tx1"/>
+          </a:solidFill>
+        </p:spPr>
+        <p:style>
+          <a:lnRef idx="2">
+            <a:schemeClr val="accent1">
+              <a:shade val="15000"/>
+            </a:schemeClr>
+          </a:lnRef>
+          <a:fillRef idx="1">
+            <a:schemeClr val="accent1"/>
+          </a:fillRef>
+          <a:effectRef idx="0">
+            <a:schemeClr val="accent1"/>
+          </a:effectRef>
+          <a:fontRef idx="minor">
+            <a:schemeClr val="lt1"/>
+          </a:fontRef>
+        </p:style>
+        <p:txBody>
+          <a:bodyPr rtlCol="0" anchor="ctr"/>
+          <a:lstStyle/>
+          <a:p>
+            <a:pPr algn="ctr"/>
+            <a:r>
+              <a:rPr lang="en-US" b="1" dirty="0"/>
+              <a:t>Unique Animal</a:t>
+            </a:r>
+          </a:p>
+        </p:txBody>
+      </p:sp>
+      <p:sp>
+        <p:nvSpPr>
+          <p:cNvPr id="12" name="TextBox 11">
+            <a:extLst>
+              <a:ext uri="{FF2B5EF4-FFF2-40B4-BE49-F238E27FC236}">
+                <a16:creationId xmlns:a16="http://schemas.microsoft.com/office/drawing/2014/main" id="{425E4041-45B0-16DD-C45E-04FBE1F809FB}"/>
+              </a:ext>
+            </a:extLst>
+          </p:cNvPr>
+          <p:cNvSpPr txBox="1"/>
+          <p:nvPr/>
+        </p:nvSpPr>
+        <p:spPr>
+          <a:xfrm>
+            <a:off x="2619082" y="2875418"/>
+            <a:ext cx="6067718" cy="1200329"/>
+          </a:xfrm>
+          <a:prstGeom prst="rect">
+            <a:avLst/>
+          </a:prstGeom>
+          <a:solidFill>
+            <a:schemeClr val="bg1"/>
+          </a:solidFill>
+        </p:spPr>
+        <p:txBody>
+          <a:bodyPr wrap="square" rtlCol="0">
+            <a:spAutoFit/>
+          </a:bodyPr>
+          <a:lstStyle/>
+          <a:p>
+            <a:r>
+              <a:rPr lang="en-US" dirty="0"/>
+              <a:t>Animal Properties: “</a:t>
+            </a:r>
+            <a:r>
+              <a:rPr lang="en-US" dirty="0" err="1"/>
+              <a:t>id_animal</a:t>
+            </a:r>
+            <a:r>
+              <a:rPr lang="en-US" dirty="0"/>
+              <a:t>”, “breed”, </a:t>
+            </a:r>
+          </a:p>
+          <a:p>
+            <a:r>
+              <a:rPr lang="en-US" dirty="0"/>
+              <a:t>                                         “</a:t>
+            </a:r>
+            <a:r>
+              <a:rPr lang="en-US" dirty="0" err="1"/>
+              <a:t>date_birth</a:t>
+            </a:r>
+            <a:r>
+              <a:rPr lang="en-US" dirty="0"/>
+              <a:t>”, “</a:t>
+            </a:r>
+            <a:r>
+              <a:rPr lang="en-US" dirty="0" err="1"/>
+              <a:t>date_died</a:t>
+            </a:r>
+            <a:r>
+              <a:rPr lang="en-US" dirty="0"/>
+              <a:t>”, “</a:t>
+            </a:r>
+            <a:r>
+              <a:rPr lang="en-US" dirty="0" err="1"/>
+              <a:t>date_sold</a:t>
+            </a:r>
+            <a:r>
+              <a:rPr lang="en-US" dirty="0"/>
+              <a:t>”, </a:t>
+            </a:r>
+          </a:p>
+          <a:p>
+            <a:r>
+              <a:rPr lang="en-US" dirty="0"/>
+              <a:t>                                         “</a:t>
+            </a:r>
+            <a:r>
+              <a:rPr lang="en-US" i="1" dirty="0" err="1">
+                <a:solidFill>
+                  <a:schemeClr val="accent1"/>
+                </a:solidFill>
+              </a:rPr>
+              <a:t>date_enrolled</a:t>
+            </a:r>
+            <a:r>
+              <a:rPr lang="en-US" i="1" dirty="0">
+                <a:solidFill>
+                  <a:schemeClr val="accent1"/>
+                </a:solidFill>
+              </a:rPr>
+              <a:t>”, “</a:t>
+            </a:r>
+            <a:r>
+              <a:rPr lang="en-US" i="1" dirty="0" err="1">
+                <a:solidFill>
+                  <a:schemeClr val="accent1"/>
+                </a:solidFill>
+              </a:rPr>
+              <a:t>date_left</a:t>
+            </a:r>
+            <a:r>
+              <a:rPr lang="en-US" i="1" dirty="0">
+                <a:solidFill>
+                  <a:schemeClr val="accent1"/>
+                </a:solidFill>
+              </a:rPr>
+              <a:t>”,</a:t>
+            </a:r>
+          </a:p>
+          <a:p>
+            <a:r>
+              <a:rPr lang="en-US" i="1" dirty="0">
+                <a:solidFill>
+                  <a:schemeClr val="accent1"/>
+                </a:solidFill>
+              </a:rPr>
+              <a:t>                                         “</a:t>
+            </a:r>
+            <a:r>
+              <a:rPr lang="en-US" i="1" dirty="0" err="1">
+                <a:solidFill>
+                  <a:schemeClr val="accent1"/>
+                </a:solidFill>
+              </a:rPr>
+              <a:t>age_enrolled</a:t>
+            </a:r>
+            <a:r>
+              <a:rPr lang="en-US" i="1" dirty="0">
+                <a:solidFill>
+                  <a:schemeClr val="accent1"/>
+                </a:solidFill>
+              </a:rPr>
+              <a:t>”, “</a:t>
+            </a:r>
+            <a:r>
+              <a:rPr lang="en-US" i="1" dirty="0" err="1">
+                <a:solidFill>
+                  <a:schemeClr val="accent1"/>
+                </a:solidFill>
+              </a:rPr>
+              <a:t>age_left</a:t>
+            </a:r>
+            <a:r>
+              <a:rPr lang="en-US" i="1" dirty="0">
+                <a:solidFill>
+                  <a:schemeClr val="accent1"/>
+                </a:solidFill>
+              </a:rPr>
+              <a:t>”</a:t>
+            </a:r>
+          </a:p>
+        </p:txBody>
+      </p:sp>
+      <p:sp>
+        <p:nvSpPr>
+          <p:cNvPr id="6" name="Rectangle 5">
+            <a:extLst>
+              <a:ext uri="{FF2B5EF4-FFF2-40B4-BE49-F238E27FC236}">
+                <a16:creationId xmlns:a16="http://schemas.microsoft.com/office/drawing/2014/main" id="{09DC2DC1-F746-2C59-832A-42B1FE22994D}"/>
+              </a:ext>
+            </a:extLst>
+          </p:cNvPr>
+          <p:cNvSpPr/>
+          <p:nvPr/>
+        </p:nvSpPr>
+        <p:spPr>
+          <a:xfrm>
+            <a:off x="10189721" y="1420607"/>
+            <a:ext cx="1799617" cy="1073830"/>
+          </a:xfrm>
+          <a:prstGeom prst="rect">
+            <a:avLst/>
+          </a:prstGeom>
+          <a:solidFill>
+            <a:srgbClr val="C00000"/>
+          </a:solidFill>
+        </p:spPr>
+        <p:style>
+          <a:lnRef idx="2">
+            <a:schemeClr val="accent1">
+              <a:shade val="15000"/>
+            </a:schemeClr>
+          </a:lnRef>
+          <a:fillRef idx="1">
+            <a:schemeClr val="accent1"/>
+          </a:fillRef>
+          <a:effectRef idx="0">
+            <a:schemeClr val="accent1"/>
+          </a:effectRef>
+          <a:fontRef idx="minor">
+            <a:schemeClr val="lt1"/>
+          </a:fontRef>
+        </p:style>
+        <p:txBody>
+          <a:bodyPr rtlCol="0" anchor="ctr"/>
+          <a:lstStyle/>
+          <a:p>
+            <a:pPr algn="ctr"/>
+            <a:r>
+              <a:rPr lang="en-US" b="1" dirty="0" err="1"/>
+              <a:t>events.parquet</a:t>
+            </a:r>
+            <a:endParaRPr lang="en-US" b="1" dirty="0"/>
+          </a:p>
+          <a:p>
+            <a:pPr algn="ctr"/>
+            <a:r>
+              <a:rPr lang="en-US" sz="1200" dirty="0"/>
+              <a:t>Each row is an event</a:t>
+            </a:r>
+          </a:p>
+        </p:txBody>
+      </p:sp>
+      <p:sp>
+        <p:nvSpPr>
+          <p:cNvPr id="14" name="Rectangle 13">
+            <a:extLst>
+              <a:ext uri="{FF2B5EF4-FFF2-40B4-BE49-F238E27FC236}">
+                <a16:creationId xmlns:a16="http://schemas.microsoft.com/office/drawing/2014/main" id="{0FA4F44E-AB45-CB00-8D13-696B1B04C53D}"/>
+              </a:ext>
+            </a:extLst>
+          </p:cNvPr>
+          <p:cNvSpPr/>
+          <p:nvPr/>
+        </p:nvSpPr>
+        <p:spPr>
+          <a:xfrm>
+            <a:off x="9572917" y="3243124"/>
+            <a:ext cx="2208179" cy="464915"/>
+          </a:xfrm>
+          <a:prstGeom prst="rect">
+            <a:avLst/>
+          </a:prstGeom>
+          <a:solidFill>
+            <a:srgbClr val="C00000"/>
+          </a:solidFill>
+        </p:spPr>
+        <p:style>
+          <a:lnRef idx="2">
+            <a:schemeClr val="accent1">
+              <a:shade val="15000"/>
+            </a:schemeClr>
+          </a:lnRef>
+          <a:fillRef idx="1">
+            <a:schemeClr val="accent1"/>
+          </a:fillRef>
+          <a:effectRef idx="0">
+            <a:schemeClr val="accent1"/>
+          </a:effectRef>
+          <a:fontRef idx="minor">
+            <a:schemeClr val="lt1"/>
+          </a:fontRef>
+        </p:style>
+        <p:txBody>
+          <a:bodyPr rtlCol="0" anchor="ctr"/>
+          <a:lstStyle/>
+          <a:p>
+            <a:pPr algn="ctr"/>
+            <a:r>
+              <a:rPr lang="en-US" b="1" dirty="0" err="1"/>
+              <a:t>animals.parquet</a:t>
+            </a:r>
+            <a:endParaRPr lang="en-US" b="1" dirty="0"/>
+          </a:p>
+          <a:p>
+            <a:pPr algn="ctr"/>
+            <a:r>
+              <a:rPr lang="en-US" sz="1200" b="1" dirty="0"/>
+              <a:t>Each row is a unique animal</a:t>
+            </a:r>
+          </a:p>
+        </p:txBody>
+      </p:sp>
+      <p:sp>
+        <p:nvSpPr>
+          <p:cNvPr id="15" name="Rectangle 14">
+            <a:extLst>
+              <a:ext uri="{FF2B5EF4-FFF2-40B4-BE49-F238E27FC236}">
+                <a16:creationId xmlns:a16="http://schemas.microsoft.com/office/drawing/2014/main" id="{07AE5C18-B772-8D05-55B6-EE022DFAD61B}"/>
+              </a:ext>
+            </a:extLst>
+          </p:cNvPr>
+          <p:cNvSpPr/>
+          <p:nvPr/>
+        </p:nvSpPr>
+        <p:spPr>
+          <a:xfrm>
+            <a:off x="119974" y="4545394"/>
+            <a:ext cx="11971347" cy="1865133"/>
+          </a:xfrm>
+          <a:prstGeom prst="rect">
+            <a:avLst/>
+          </a:prstGeom>
+        </p:spPr>
+        <p:style>
+          <a:lnRef idx="2">
+            <a:schemeClr val="accent1">
+              <a:shade val="15000"/>
+            </a:schemeClr>
+          </a:lnRef>
+          <a:fillRef idx="1">
+            <a:schemeClr val="accent1"/>
+          </a:fillRef>
+          <a:effectRef idx="0">
+            <a:schemeClr val="accent1"/>
+          </a:effectRef>
+          <a:fontRef idx="minor">
+            <a:schemeClr val="lt1"/>
+          </a:fontRef>
+        </p:style>
+        <p:txBody>
+          <a:bodyPr rtlCol="0" anchor="ctr"/>
+          <a:lstStyle/>
+          <a:p>
+            <a:pPr algn="ctr"/>
+            <a:endParaRPr lang="en-US"/>
+          </a:p>
+        </p:txBody>
+      </p:sp>
+      <p:sp>
+        <p:nvSpPr>
+          <p:cNvPr id="16" name="Oval 15">
+            <a:extLst>
+              <a:ext uri="{FF2B5EF4-FFF2-40B4-BE49-F238E27FC236}">
+                <a16:creationId xmlns:a16="http://schemas.microsoft.com/office/drawing/2014/main" id="{65EE8DA0-6C67-A4BC-AD3F-1A31366F7B4F}"/>
+              </a:ext>
+            </a:extLst>
+          </p:cNvPr>
+          <p:cNvSpPr/>
+          <p:nvPr/>
+        </p:nvSpPr>
+        <p:spPr>
+          <a:xfrm>
+            <a:off x="119974" y="4591677"/>
+            <a:ext cx="2021013" cy="744373"/>
+          </a:xfrm>
+          <a:prstGeom prst="ellipse">
+            <a:avLst/>
+          </a:prstGeom>
+          <a:solidFill>
+            <a:schemeClr val="tx1"/>
+          </a:solidFill>
+        </p:spPr>
+        <p:style>
+          <a:lnRef idx="2">
+            <a:schemeClr val="accent1">
+              <a:shade val="15000"/>
+            </a:schemeClr>
+          </a:lnRef>
+          <a:fillRef idx="1">
+            <a:schemeClr val="accent1"/>
+          </a:fillRef>
+          <a:effectRef idx="0">
+            <a:schemeClr val="accent1"/>
+          </a:effectRef>
+          <a:fontRef idx="minor">
+            <a:schemeClr val="lt1"/>
+          </a:fontRef>
+        </p:style>
+        <p:txBody>
+          <a:bodyPr rtlCol="0" anchor="ctr"/>
+          <a:lstStyle/>
+          <a:p>
+            <a:pPr algn="ctr"/>
+            <a:r>
+              <a:rPr lang="en-US" b="1" dirty="0"/>
+              <a:t>Unique Animal</a:t>
+            </a:r>
+          </a:p>
+        </p:txBody>
+      </p:sp>
+      <p:sp>
+        <p:nvSpPr>
+          <p:cNvPr id="17" name="TextBox 16">
+            <a:extLst>
+              <a:ext uri="{FF2B5EF4-FFF2-40B4-BE49-F238E27FC236}">
+                <a16:creationId xmlns:a16="http://schemas.microsoft.com/office/drawing/2014/main" id="{CB48FC2A-7E09-DA21-9EF9-9F794A9A8CC3}"/>
+              </a:ext>
+            </a:extLst>
+          </p:cNvPr>
+          <p:cNvSpPr txBox="1"/>
+          <p:nvPr/>
+        </p:nvSpPr>
+        <p:spPr>
+          <a:xfrm>
+            <a:off x="2638377" y="4735885"/>
+            <a:ext cx="7838312" cy="1200329"/>
+          </a:xfrm>
+          <a:prstGeom prst="rect">
+            <a:avLst/>
+          </a:prstGeom>
+          <a:solidFill>
+            <a:schemeClr val="bg1"/>
+          </a:solidFill>
+        </p:spPr>
+        <p:txBody>
+          <a:bodyPr wrap="square" rtlCol="0">
+            <a:spAutoFit/>
+          </a:bodyPr>
+          <a:lstStyle/>
+          <a:p>
+            <a:r>
+              <a:rPr lang="en-US" dirty="0"/>
+              <a:t>Lactation Properties: “</a:t>
+            </a:r>
+            <a:r>
+              <a:rPr lang="en-US" dirty="0" err="1"/>
+              <a:t>id_animal</a:t>
+            </a:r>
+            <a:r>
+              <a:rPr lang="en-US" dirty="0"/>
+              <a:t>”, “</a:t>
+            </a:r>
+            <a:r>
+              <a:rPr lang="en-US" dirty="0" err="1"/>
+              <a:t>lact</a:t>
+            </a:r>
+            <a:r>
+              <a:rPr lang="en-US" dirty="0"/>
+              <a:t>”, “</a:t>
+            </a:r>
+            <a:r>
+              <a:rPr lang="en-US" dirty="0" err="1"/>
+              <a:t>lact_group</a:t>
+            </a:r>
+            <a:r>
+              <a:rPr lang="en-US" dirty="0"/>
+              <a:t>”,</a:t>
+            </a:r>
+          </a:p>
+          <a:p>
+            <a:r>
+              <a:rPr lang="en-US" dirty="0"/>
+              <a:t>                                              “</a:t>
+            </a:r>
+            <a:r>
+              <a:rPr lang="en-US" dirty="0" err="1"/>
+              <a:t>date_fresh</a:t>
+            </a:r>
+            <a:r>
+              <a:rPr lang="en-US" dirty="0"/>
+              <a:t>”, “</a:t>
+            </a:r>
+            <a:r>
+              <a:rPr lang="en-US" dirty="0" err="1"/>
+              <a:t>date_dry</a:t>
+            </a:r>
+            <a:r>
+              <a:rPr lang="en-US" dirty="0"/>
+              <a:t>”, “</a:t>
+            </a:r>
+            <a:r>
+              <a:rPr lang="en-US" dirty="0" err="1"/>
+              <a:t>date_next_fresh</a:t>
+            </a:r>
+            <a:r>
+              <a:rPr lang="en-US" dirty="0"/>
+              <a:t>”, </a:t>
+            </a:r>
+          </a:p>
+          <a:p>
+            <a:r>
+              <a:rPr lang="en-US" dirty="0"/>
+              <a:t>                                              </a:t>
+            </a:r>
+            <a:r>
+              <a:rPr lang="en-US" i="1" dirty="0">
+                <a:solidFill>
+                  <a:schemeClr val="accent1"/>
+                </a:solidFill>
+              </a:rPr>
+              <a:t>“</a:t>
+            </a:r>
+            <a:r>
+              <a:rPr lang="en-US" i="1" dirty="0" err="1">
+                <a:solidFill>
+                  <a:schemeClr val="accent1"/>
+                </a:solidFill>
+              </a:rPr>
+              <a:t>date_archived</a:t>
+            </a:r>
+            <a:r>
+              <a:rPr lang="en-US" i="1" dirty="0">
+                <a:solidFill>
+                  <a:schemeClr val="accent1"/>
+                </a:solidFill>
+              </a:rPr>
+              <a:t>”, “</a:t>
+            </a:r>
+            <a:r>
+              <a:rPr lang="en-US" i="1" dirty="0" err="1">
+                <a:solidFill>
+                  <a:schemeClr val="accent1"/>
+                </a:solidFill>
+              </a:rPr>
+              <a:t>dim_at_archive</a:t>
+            </a:r>
+            <a:r>
+              <a:rPr lang="en-US" i="1" dirty="0">
+                <a:solidFill>
+                  <a:schemeClr val="accent1"/>
+                </a:solidFill>
+              </a:rPr>
+              <a:t>”, “</a:t>
+            </a:r>
+            <a:r>
+              <a:rPr lang="en-US" i="1" dirty="0" err="1">
+                <a:solidFill>
+                  <a:schemeClr val="accent1"/>
+                </a:solidFill>
+              </a:rPr>
+              <a:t>age_at_archive</a:t>
+            </a:r>
+            <a:r>
+              <a:rPr lang="en-US" i="1" dirty="0">
+                <a:solidFill>
+                  <a:schemeClr val="accent1"/>
+                </a:solidFill>
+              </a:rPr>
+              <a:t>”</a:t>
+            </a:r>
+          </a:p>
+          <a:p>
+            <a:r>
+              <a:rPr lang="en-US" i="1" dirty="0">
+                <a:solidFill>
+                  <a:schemeClr val="accent1"/>
+                </a:solidFill>
+              </a:rPr>
+              <a:t>                                               “</a:t>
+            </a:r>
+            <a:r>
+              <a:rPr lang="en-US" i="1" dirty="0" err="1">
+                <a:solidFill>
+                  <a:schemeClr val="accent1"/>
+                </a:solidFill>
+              </a:rPr>
+              <a:t>date_dim</a:t>
+            </a:r>
+            <a:r>
+              <a:rPr lang="en-US" i="1" dirty="0">
+                <a:solidFill>
+                  <a:schemeClr val="accent1"/>
+                </a:solidFill>
+              </a:rPr>
+              <a:t>##”</a:t>
+            </a:r>
+          </a:p>
+        </p:txBody>
+      </p:sp>
+      <p:sp>
+        <p:nvSpPr>
+          <p:cNvPr id="18" name="Rectangle 17">
+            <a:extLst>
+              <a:ext uri="{FF2B5EF4-FFF2-40B4-BE49-F238E27FC236}">
+                <a16:creationId xmlns:a16="http://schemas.microsoft.com/office/drawing/2014/main" id="{F4286412-220C-8E0D-58C9-73A924CDA9F3}"/>
+              </a:ext>
+            </a:extLst>
+          </p:cNvPr>
+          <p:cNvSpPr/>
+          <p:nvPr/>
+        </p:nvSpPr>
+        <p:spPr>
+          <a:xfrm>
+            <a:off x="8686800" y="5699357"/>
+            <a:ext cx="3224717" cy="582339"/>
+          </a:xfrm>
+          <a:prstGeom prst="rect">
+            <a:avLst/>
+          </a:prstGeom>
+          <a:solidFill>
+            <a:srgbClr val="C00000"/>
+          </a:solidFill>
+        </p:spPr>
+        <p:style>
+          <a:lnRef idx="2">
+            <a:schemeClr val="accent1">
+              <a:shade val="15000"/>
+            </a:schemeClr>
+          </a:lnRef>
+          <a:fillRef idx="1">
+            <a:schemeClr val="accent1"/>
+          </a:fillRef>
+          <a:effectRef idx="0">
+            <a:schemeClr val="accent1"/>
+          </a:effectRef>
+          <a:fontRef idx="minor">
+            <a:schemeClr val="lt1"/>
+          </a:fontRef>
+        </p:style>
+        <p:txBody>
+          <a:bodyPr rtlCol="0" anchor="ctr"/>
+          <a:lstStyle/>
+          <a:p>
+            <a:pPr algn="ctr"/>
+            <a:r>
+              <a:rPr lang="en-US" b="1" dirty="0" err="1"/>
+              <a:t>animal_lactations.parquet</a:t>
+            </a:r>
+            <a:endParaRPr lang="en-US" b="1" dirty="0"/>
+          </a:p>
+          <a:p>
+            <a:pPr algn="ctr"/>
+            <a:r>
+              <a:rPr lang="en-US" sz="1200" b="1" dirty="0"/>
+              <a:t>Each row is a lactation</a:t>
+            </a:r>
+            <a:endParaRPr lang="en-US" dirty="0"/>
+          </a:p>
+        </p:txBody>
+      </p:sp>
+      <p:sp>
+        <p:nvSpPr>
+          <p:cNvPr id="8" name="Isosceles Triangle 7">
+            <a:extLst>
+              <a:ext uri="{FF2B5EF4-FFF2-40B4-BE49-F238E27FC236}">
+                <a16:creationId xmlns:a16="http://schemas.microsoft.com/office/drawing/2014/main" id="{EBC05ED7-F3D2-239D-EB94-68C7ACBF0052}"/>
+              </a:ext>
+            </a:extLst>
+          </p:cNvPr>
+          <p:cNvSpPr/>
+          <p:nvPr/>
+        </p:nvSpPr>
+        <p:spPr>
+          <a:xfrm>
+            <a:off x="634638" y="5105333"/>
+            <a:ext cx="2402732" cy="744372"/>
+          </a:xfrm>
+          <a:prstGeom prst="triangle">
+            <a:avLst/>
+          </a:prstGeom>
+          <a:solidFill>
+            <a:schemeClr val="tx1"/>
+          </a:solidFill>
+        </p:spPr>
+        <p:style>
+          <a:lnRef idx="2">
+            <a:schemeClr val="accent1">
+              <a:shade val="15000"/>
+            </a:schemeClr>
+          </a:lnRef>
+          <a:fillRef idx="1">
+            <a:schemeClr val="accent1"/>
+          </a:fillRef>
+          <a:effectRef idx="0">
+            <a:schemeClr val="accent1"/>
+          </a:effectRef>
+          <a:fontRef idx="minor">
+            <a:schemeClr val="lt1"/>
+          </a:fontRef>
+        </p:style>
+        <p:txBody>
+          <a:bodyPr rtlCol="0" anchor="ctr"/>
+          <a:lstStyle/>
+          <a:p>
+            <a:pPr algn="ctr"/>
+            <a:r>
+              <a:rPr lang="en-US" b="1" dirty="0"/>
+              <a:t>Time</a:t>
+            </a:r>
+          </a:p>
+          <a:p>
+            <a:pPr algn="ctr"/>
+            <a:endParaRPr lang="en-US" dirty="0"/>
+          </a:p>
+        </p:txBody>
+      </p:sp>
+    </p:spTree>
+    <p:extLst>
+      <p:ext uri="{BB962C8B-B14F-4D97-AF65-F5344CB8AC3E}">
+        <p14:creationId xmlns:p14="http://schemas.microsoft.com/office/powerpoint/2010/main" val="2507303409"/>
+      </p:ext>
+    </p:extLst>
+  </p:cSld>
+  <p:clrMapOvr>
+    <a:masterClrMapping/>
+  </p:clrMapOvr>
+</p:sld>
+</file>
+
+<file path=ppt/slides/slide11.xml><?xml version="1.0" encoding="utf-8"?>
+<p:sld xmlns:a="http://schemas.openxmlformats.org/drawingml/2006/main" xmlns:r="http://schemas.openxmlformats.org/officeDocument/2006/relationships" xmlns:p="http://schemas.openxmlformats.org/presentationml/2006/main">
+  <p:cSld>
+    <p:spTree>
+      <p:nvGrpSpPr>
+        <p:cNvPr id="1" name="">
+          <a:extLst>
+            <a:ext uri="{FF2B5EF4-FFF2-40B4-BE49-F238E27FC236}">
+              <a16:creationId xmlns:a16="http://schemas.microsoft.com/office/drawing/2014/main" id="{4B23D998-895C-626D-F349-6BE98BFD3D0D}"/>
+            </a:ext>
+          </a:extLst>
+        </p:cNvPr>
+        <p:cNvGrpSpPr/>
+        <p:nvPr/>
+      </p:nvGrpSpPr>
+      <p:grpSpPr>
+        <a:xfrm>
+          <a:off x="0" y="0"/>
+          <a:ext cx="0" cy="0"/>
+          <a:chOff x="0" y="0"/>
+          <a:chExt cx="0" cy="0"/>
+        </a:xfrm>
+      </p:grpSpPr>
+      <p:sp>
+        <p:nvSpPr>
+          <p:cNvPr id="9" name="Rectangle 8">
+            <a:extLst>
+              <a:ext uri="{FF2B5EF4-FFF2-40B4-BE49-F238E27FC236}">
+                <a16:creationId xmlns:a16="http://schemas.microsoft.com/office/drawing/2014/main" id="{1FD3CCE0-0C1F-7256-4E90-7437083F03C8}"/>
+              </a:ext>
+            </a:extLst>
+          </p:cNvPr>
+          <p:cNvSpPr/>
+          <p:nvPr/>
+        </p:nvSpPr>
+        <p:spPr>
+          <a:xfrm>
+            <a:off x="100678" y="2684928"/>
+            <a:ext cx="11971347" cy="1581310"/>
+          </a:xfrm>
+          <a:prstGeom prst="rect">
+            <a:avLst/>
+          </a:prstGeom>
+        </p:spPr>
+        <p:style>
+          <a:lnRef idx="2">
+            <a:schemeClr val="accent1">
+              <a:shade val="15000"/>
+            </a:schemeClr>
+          </a:lnRef>
+          <a:fillRef idx="1">
+            <a:schemeClr val="accent1"/>
+          </a:fillRef>
+          <a:effectRef idx="0">
+            <a:schemeClr val="accent1"/>
+          </a:effectRef>
+          <a:fontRef idx="minor">
+            <a:schemeClr val="lt1"/>
+          </a:fontRef>
+        </p:style>
+        <p:txBody>
+          <a:bodyPr rtlCol="0" anchor="ctr"/>
+          <a:lstStyle/>
+          <a:p>
+            <a:pPr algn="ctr"/>
+            <a:endParaRPr lang="en-US" dirty="0"/>
+          </a:p>
+        </p:txBody>
+      </p:sp>
+      <p:sp>
+        <p:nvSpPr>
+          <p:cNvPr id="4" name="Rectangle 3">
+            <a:extLst>
+              <a:ext uri="{FF2B5EF4-FFF2-40B4-BE49-F238E27FC236}">
+                <a16:creationId xmlns:a16="http://schemas.microsoft.com/office/drawing/2014/main" id="{7504C15E-096D-3903-5184-6B0874FAE232}"/>
+              </a:ext>
+            </a:extLst>
+          </p:cNvPr>
+          <p:cNvSpPr/>
+          <p:nvPr/>
+        </p:nvSpPr>
+        <p:spPr>
+          <a:xfrm>
+            <a:off x="100679" y="972766"/>
+            <a:ext cx="11971347" cy="1581310"/>
+          </a:xfrm>
+          <a:prstGeom prst="rect">
+            <a:avLst/>
+          </a:prstGeom>
+        </p:spPr>
+        <p:style>
+          <a:lnRef idx="2">
+            <a:schemeClr val="accent1">
+              <a:shade val="15000"/>
+            </a:schemeClr>
+          </a:lnRef>
+          <a:fillRef idx="1">
+            <a:schemeClr val="accent1"/>
+          </a:fillRef>
+          <a:effectRef idx="0">
+            <a:schemeClr val="accent1"/>
+          </a:effectRef>
+          <a:fontRef idx="minor">
+            <a:schemeClr val="lt1"/>
+          </a:fontRef>
+        </p:style>
+        <p:txBody>
+          <a:bodyPr rtlCol="0" anchor="ctr"/>
+          <a:lstStyle/>
+          <a:p>
+            <a:pPr algn="ctr"/>
+            <a:endParaRPr lang="en-US"/>
+          </a:p>
+        </p:txBody>
+      </p:sp>
+      <p:graphicFrame>
+        <p:nvGraphicFramePr>
+          <p:cNvPr id="2" name="Table 1">
+            <a:extLst>
+              <a:ext uri="{FF2B5EF4-FFF2-40B4-BE49-F238E27FC236}">
+                <a16:creationId xmlns:a16="http://schemas.microsoft.com/office/drawing/2014/main" id="{5AB35D03-E502-08F3-9864-A96D82175423}"/>
+              </a:ext>
+            </a:extLst>
+          </p:cNvPr>
+          <p:cNvGraphicFramePr>
+            <a:graphicFrameLocks noGrp="1"/>
+          </p:cNvGraphicFramePr>
+          <p:nvPr/>
+        </p:nvGraphicFramePr>
+        <p:xfrm>
+          <a:off x="1712065" y="1233818"/>
+          <a:ext cx="8394969" cy="1112520"/>
+        </p:xfrm>
+        <a:graphic>
+          <a:graphicData uri="http://schemas.openxmlformats.org/drawingml/2006/table">
+            <a:tbl>
+              <a:tblPr firstRow="1" bandRow="1">
+                <a:tableStyleId>{073A0DAA-6AF3-43AB-8588-CEC1D06C72B9}</a:tableStyleId>
+              </a:tblPr>
+              <a:tblGrid>
+                <a:gridCol w="1021405">
+                  <a:extLst>
+                    <a:ext uri="{9D8B030D-6E8A-4147-A177-3AD203B41FA5}">
+                      <a16:colId xmlns:a16="http://schemas.microsoft.com/office/drawing/2014/main" val="1757777607"/>
+                    </a:ext>
+                  </a:extLst>
+                </a:gridCol>
+                <a:gridCol w="690664">
+                  <a:extLst>
+                    <a:ext uri="{9D8B030D-6E8A-4147-A177-3AD203B41FA5}">
+                      <a16:colId xmlns:a16="http://schemas.microsoft.com/office/drawing/2014/main" val="1794545505"/>
+                    </a:ext>
+                  </a:extLst>
+                </a:gridCol>
+                <a:gridCol w="1118681">
+                  <a:extLst>
+                    <a:ext uri="{9D8B030D-6E8A-4147-A177-3AD203B41FA5}">
+                      <a16:colId xmlns:a16="http://schemas.microsoft.com/office/drawing/2014/main" val="2055577220"/>
+                    </a:ext>
+                  </a:extLst>
+                </a:gridCol>
+                <a:gridCol w="5564219">
+                  <a:extLst>
+                    <a:ext uri="{9D8B030D-6E8A-4147-A177-3AD203B41FA5}">
+                      <a16:colId xmlns:a16="http://schemas.microsoft.com/office/drawing/2014/main" val="479773502"/>
+                    </a:ext>
+                  </a:extLst>
+                </a:gridCol>
+              </a:tblGrid>
+              <a:tr h="370840">
+                <a:tc>
+                  <a:txBody>
+                    <a:bodyPr/>
+                    <a:lstStyle/>
+                    <a:p>
+                      <a:r>
+                        <a:rPr lang="en-US" dirty="0"/>
+                        <a:t>Animal</a:t>
+                      </a:r>
+                    </a:p>
+                  </a:txBody>
+                  <a:tcPr/>
+                </a:tc>
+                <a:tc>
+                  <a:txBody>
+                    <a:bodyPr/>
+                    <a:lstStyle/>
+                    <a:p>
+                      <a:r>
+                        <a:rPr lang="en-US" dirty="0"/>
+                        <a:t>Date</a:t>
+                      </a:r>
+                    </a:p>
+                  </a:txBody>
+                  <a:tcPr/>
+                </a:tc>
+                <a:tc>
+                  <a:txBody>
+                    <a:bodyPr/>
+                    <a:lstStyle/>
+                    <a:p>
+                      <a:r>
+                        <a:rPr lang="en-US" dirty="0"/>
+                        <a:t>Location</a:t>
+                      </a:r>
+                    </a:p>
+                  </a:txBody>
+                  <a:tcPr/>
+                </a:tc>
+                <a:tc>
+                  <a:txBody>
+                    <a:bodyPr/>
+                    <a:lstStyle/>
+                    <a:p>
+                      <a:r>
+                        <a:rPr lang="en-US" dirty="0"/>
+                        <a:t>Description  (</a:t>
+                      </a:r>
+                      <a:r>
+                        <a:rPr lang="en-US" dirty="0" err="1"/>
+                        <a:t>lact</a:t>
+                      </a:r>
+                      <a:r>
+                        <a:rPr lang="en-US" dirty="0"/>
+                        <a:t>, event, remark, protocol, </a:t>
+                      </a:r>
+                      <a:r>
+                        <a:rPr lang="en-US" dirty="0" err="1"/>
+                        <a:t>etc</a:t>
+                      </a:r>
+                      <a:r>
+                        <a:rPr lang="en-US" dirty="0"/>
+                        <a:t>)</a:t>
+                      </a:r>
+                    </a:p>
+                  </a:txBody>
+                  <a:tcPr/>
+                </a:tc>
+                <a:extLst>
+                  <a:ext uri="{0D108BD9-81ED-4DB2-BD59-A6C34878D82A}">
+                    <a16:rowId xmlns:a16="http://schemas.microsoft.com/office/drawing/2014/main" val="209182417"/>
+                  </a:ext>
+                </a:extLst>
+              </a:tr>
+              <a:tr h="370840">
+                <a:tc>
+                  <a:txBody>
+                    <a:bodyPr/>
+                    <a:lstStyle/>
+                    <a:p>
+                      <a:endParaRPr lang="en-US" dirty="0"/>
+                    </a:p>
+                  </a:txBody>
+                  <a:tcPr/>
+                </a:tc>
+                <a:tc>
+                  <a:txBody>
+                    <a:bodyPr/>
+                    <a:lstStyle/>
+                    <a:p>
+                      <a:endParaRPr lang="en-US" dirty="0"/>
+                    </a:p>
+                  </a:txBody>
+                  <a:tcPr/>
+                </a:tc>
+                <a:tc>
+                  <a:txBody>
+                    <a:bodyPr/>
+                    <a:lstStyle/>
+                    <a:p>
+                      <a:endParaRPr lang="en-US" dirty="0"/>
+                    </a:p>
+                  </a:txBody>
+                  <a:tcPr/>
+                </a:tc>
+                <a:tc>
+                  <a:txBody>
+                    <a:bodyPr/>
+                    <a:lstStyle/>
+                    <a:p>
+                      <a:endParaRPr lang="en-US" dirty="0"/>
+                    </a:p>
+                  </a:txBody>
+                  <a:tcPr/>
+                </a:tc>
+                <a:extLst>
+                  <a:ext uri="{0D108BD9-81ED-4DB2-BD59-A6C34878D82A}">
+                    <a16:rowId xmlns:a16="http://schemas.microsoft.com/office/drawing/2014/main" val="2461913732"/>
+                  </a:ext>
+                </a:extLst>
+              </a:tr>
+              <a:tr h="370840">
+                <a:tc>
+                  <a:txBody>
+                    <a:bodyPr/>
+                    <a:lstStyle/>
+                    <a:p>
+                      <a:endParaRPr lang="en-US" dirty="0"/>
+                    </a:p>
+                  </a:txBody>
+                  <a:tcPr/>
+                </a:tc>
+                <a:tc>
+                  <a:txBody>
+                    <a:bodyPr/>
+                    <a:lstStyle/>
+                    <a:p>
+                      <a:endParaRPr lang="en-US" dirty="0"/>
+                    </a:p>
+                  </a:txBody>
+                  <a:tcPr/>
+                </a:tc>
+                <a:tc>
+                  <a:txBody>
+                    <a:bodyPr/>
+                    <a:lstStyle/>
+                    <a:p>
+                      <a:endParaRPr lang="en-US" dirty="0"/>
+                    </a:p>
+                  </a:txBody>
+                  <a:tcPr/>
+                </a:tc>
+                <a:tc>
+                  <a:txBody>
+                    <a:bodyPr/>
+                    <a:lstStyle/>
+                    <a:p>
+                      <a:endParaRPr lang="en-US" dirty="0"/>
+                    </a:p>
+                  </a:txBody>
+                  <a:tcPr/>
+                </a:tc>
+                <a:extLst>
+                  <a:ext uri="{0D108BD9-81ED-4DB2-BD59-A6C34878D82A}">
+                    <a16:rowId xmlns:a16="http://schemas.microsoft.com/office/drawing/2014/main" val="2618388061"/>
+                  </a:ext>
+                </a:extLst>
+              </a:tr>
+            </a:tbl>
+          </a:graphicData>
+        </a:graphic>
+      </p:graphicFrame>
+      <p:sp>
+        <p:nvSpPr>
+          <p:cNvPr id="3" name="TextBox 2">
+            <a:extLst>
+              <a:ext uri="{FF2B5EF4-FFF2-40B4-BE49-F238E27FC236}">
                 <a16:creationId xmlns:a16="http://schemas.microsoft.com/office/drawing/2014/main" id="{862E4A28-3FE4-E8F6-780E-15947C662B7A}"/>
               </a:ext>
             </a:extLst>
@@ -5625,6 +6788,447 @@
 </file>
 
 <file path=ppt/slides/slide2.xml><?xml version="1.0" encoding="utf-8"?>
+<p:sld xmlns:a="http://schemas.openxmlformats.org/drawingml/2006/main" xmlns:r="http://schemas.openxmlformats.org/officeDocument/2006/relationships" xmlns:p="http://schemas.openxmlformats.org/presentationml/2006/main">
+  <p:cSld>
+    <p:spTree>
+      <p:nvGrpSpPr>
+        <p:cNvPr id="1" name=""/>
+        <p:cNvGrpSpPr/>
+        <p:nvPr/>
+      </p:nvGrpSpPr>
+      <p:grpSpPr>
+        <a:xfrm>
+          <a:off x="0" y="0"/>
+          <a:ext cx="0" cy="0"/>
+          <a:chOff x="0" y="0"/>
+          <a:chExt cx="0" cy="0"/>
+        </a:xfrm>
+      </p:grpSpPr>
+      <p:pic>
+        <p:nvPicPr>
+          <p:cNvPr id="3" name="Picture 2">
+            <a:extLst>
+              <a:ext uri="{FF2B5EF4-FFF2-40B4-BE49-F238E27FC236}">
+                <a16:creationId xmlns:a16="http://schemas.microsoft.com/office/drawing/2014/main" id="{113A60D9-5C0D-16DE-9EA3-506F321BC0CD}"/>
+              </a:ext>
+            </a:extLst>
+          </p:cNvPr>
+          <p:cNvPicPr>
+            <a:picLocks noChangeAspect="1"/>
+          </p:cNvPicPr>
+          <p:nvPr/>
+        </p:nvPicPr>
+        <p:blipFill>
+          <a:blip r:embed="rId2"/>
+          <a:srcRect l="21701" t="10134" r="24313" b="2821"/>
+          <a:stretch>
+            <a:fillRect/>
+          </a:stretch>
+        </p:blipFill>
+        <p:spPr>
+          <a:xfrm>
+            <a:off x="7599681" y="130278"/>
+            <a:ext cx="3352800" cy="6597444"/>
+          </a:xfrm>
+          <a:prstGeom prst="rect">
+            <a:avLst/>
+          </a:prstGeom>
+        </p:spPr>
+      </p:pic>
+      <p:sp>
+        <p:nvSpPr>
+          <p:cNvPr id="4" name="Callout: Line 3">
+            <a:extLst>
+              <a:ext uri="{FF2B5EF4-FFF2-40B4-BE49-F238E27FC236}">
+                <a16:creationId xmlns:a16="http://schemas.microsoft.com/office/drawing/2014/main" id="{34B1E8EB-999F-93D2-1422-09F4DB86741C}"/>
+              </a:ext>
+            </a:extLst>
+          </p:cNvPr>
+          <p:cNvSpPr/>
+          <p:nvPr/>
+        </p:nvSpPr>
+        <p:spPr>
+          <a:xfrm>
+            <a:off x="10952481" y="662202"/>
+            <a:ext cx="1076960" cy="477520"/>
+          </a:xfrm>
+          <a:prstGeom prst="borderCallout1">
+            <a:avLst>
+              <a:gd name="adj1" fmla="val 18750"/>
+              <a:gd name="adj2" fmla="val -8333"/>
+              <a:gd name="adj3" fmla="val -68351"/>
+              <a:gd name="adj4" fmla="val -27013"/>
+            </a:avLst>
+          </a:prstGeom>
+          <a:solidFill>
+            <a:srgbClr val="FFFF00"/>
+          </a:solidFill>
+          <a:ln w="57150">
+            <a:solidFill>
+              <a:schemeClr val="tx1"/>
+            </a:solidFill>
+          </a:ln>
+        </p:spPr>
+        <p:style>
+          <a:lnRef idx="2">
+            <a:schemeClr val="accent1">
+              <a:shade val="15000"/>
+            </a:schemeClr>
+          </a:lnRef>
+          <a:fillRef idx="1">
+            <a:schemeClr val="accent1"/>
+          </a:fillRef>
+          <a:effectRef idx="0">
+            <a:schemeClr val="accent1"/>
+          </a:effectRef>
+          <a:fontRef idx="minor">
+            <a:schemeClr val="lt1"/>
+          </a:fontRef>
+        </p:style>
+        <p:txBody>
+          <a:bodyPr rtlCol="0" anchor="ctr"/>
+          <a:lstStyle/>
+          <a:p>
+            <a:pPr algn="ctr"/>
+            <a:r>
+              <a:rPr lang="en-US" b="1" dirty="0">
+                <a:solidFill>
+                  <a:schemeClr val="tx1"/>
+                </a:solidFill>
+              </a:rPr>
+              <a:t>Outline</a:t>
+            </a:r>
+          </a:p>
+        </p:txBody>
+      </p:sp>
+      <p:sp>
+        <p:nvSpPr>
+          <p:cNvPr id="5" name="Double Brace 4">
+            <a:extLst>
+              <a:ext uri="{FF2B5EF4-FFF2-40B4-BE49-F238E27FC236}">
+                <a16:creationId xmlns:a16="http://schemas.microsoft.com/office/drawing/2014/main" id="{D99962A4-ED29-0CC9-A814-3C99148ABCF1}"/>
+              </a:ext>
+            </a:extLst>
+          </p:cNvPr>
+          <p:cNvSpPr/>
+          <p:nvPr/>
+        </p:nvSpPr>
+        <p:spPr>
+          <a:xfrm>
+            <a:off x="7691119" y="1574800"/>
+            <a:ext cx="3261361" cy="2448560"/>
+          </a:xfrm>
+          <a:prstGeom prst="bracePair">
+            <a:avLst/>
+          </a:prstGeom>
+          <a:ln>
+            <a:solidFill>
+              <a:srgbClr val="FFFF00"/>
+            </a:solidFill>
+          </a:ln>
+        </p:spPr>
+        <p:style>
+          <a:lnRef idx="2">
+            <a:schemeClr val="accent1"/>
+          </a:lnRef>
+          <a:fillRef idx="0">
+            <a:schemeClr val="accent1"/>
+          </a:fillRef>
+          <a:effectRef idx="1">
+            <a:schemeClr val="accent1"/>
+          </a:effectRef>
+          <a:fontRef idx="minor">
+            <a:schemeClr val="tx1"/>
+          </a:fontRef>
+        </p:style>
+        <p:txBody>
+          <a:bodyPr rtlCol="0" anchor="ctr"/>
+          <a:lstStyle/>
+          <a:p>
+            <a:pPr algn="ctr"/>
+            <a:endParaRPr lang="en-US"/>
+          </a:p>
+        </p:txBody>
+      </p:sp>
+      <p:sp>
+        <p:nvSpPr>
+          <p:cNvPr id="6" name="Double Brace 5">
+            <a:extLst>
+              <a:ext uri="{FF2B5EF4-FFF2-40B4-BE49-F238E27FC236}">
+                <a16:creationId xmlns:a16="http://schemas.microsoft.com/office/drawing/2014/main" id="{B5F428EB-3479-3292-7E87-E9E668C824EB}"/>
+              </a:ext>
+            </a:extLst>
+          </p:cNvPr>
+          <p:cNvSpPr/>
+          <p:nvPr/>
+        </p:nvSpPr>
+        <p:spPr>
+          <a:xfrm>
+            <a:off x="7752080" y="4058920"/>
+            <a:ext cx="3169920" cy="1224280"/>
+          </a:xfrm>
+          <a:prstGeom prst="bracePair">
+            <a:avLst>
+              <a:gd name="adj" fmla="val 13312"/>
+            </a:avLst>
+          </a:prstGeom>
+          <a:ln>
+            <a:solidFill>
+              <a:srgbClr val="FF0000"/>
+            </a:solidFill>
+          </a:ln>
+        </p:spPr>
+        <p:style>
+          <a:lnRef idx="2">
+            <a:schemeClr val="accent1"/>
+          </a:lnRef>
+          <a:fillRef idx="0">
+            <a:schemeClr val="accent1"/>
+          </a:fillRef>
+          <a:effectRef idx="1">
+            <a:schemeClr val="accent1"/>
+          </a:effectRef>
+          <a:fontRef idx="minor">
+            <a:schemeClr val="tx1"/>
+          </a:fontRef>
+        </p:style>
+        <p:txBody>
+          <a:bodyPr rtlCol="0" anchor="ctr"/>
+          <a:lstStyle/>
+          <a:p>
+            <a:pPr algn="ctr"/>
+            <a:endParaRPr lang="en-US"/>
+          </a:p>
+        </p:txBody>
+      </p:sp>
+      <p:sp>
+        <p:nvSpPr>
+          <p:cNvPr id="7" name="Double Brace 6">
+            <a:extLst>
+              <a:ext uri="{FF2B5EF4-FFF2-40B4-BE49-F238E27FC236}">
+                <a16:creationId xmlns:a16="http://schemas.microsoft.com/office/drawing/2014/main" id="{7390D12D-9659-37E6-2725-6C3BF038B429}"/>
+              </a:ext>
+            </a:extLst>
+          </p:cNvPr>
+          <p:cNvSpPr/>
+          <p:nvPr/>
+        </p:nvSpPr>
+        <p:spPr>
+          <a:xfrm>
+            <a:off x="7782560" y="5318760"/>
+            <a:ext cx="3169920" cy="533400"/>
+          </a:xfrm>
+          <a:prstGeom prst="bracePair">
+            <a:avLst>
+              <a:gd name="adj" fmla="val 25000"/>
+            </a:avLst>
+          </a:prstGeom>
+          <a:ln>
+            <a:solidFill>
+              <a:srgbClr val="FFFF00"/>
+            </a:solidFill>
+          </a:ln>
+        </p:spPr>
+        <p:style>
+          <a:lnRef idx="2">
+            <a:schemeClr val="accent1"/>
+          </a:lnRef>
+          <a:fillRef idx="0">
+            <a:schemeClr val="accent1"/>
+          </a:fillRef>
+          <a:effectRef idx="1">
+            <a:schemeClr val="accent1"/>
+          </a:effectRef>
+          <a:fontRef idx="minor">
+            <a:schemeClr val="tx1"/>
+          </a:fontRef>
+        </p:style>
+        <p:txBody>
+          <a:bodyPr rtlCol="0" anchor="ctr"/>
+          <a:lstStyle/>
+          <a:p>
+            <a:pPr algn="ctr"/>
+            <a:endParaRPr lang="en-US"/>
+          </a:p>
+        </p:txBody>
+      </p:sp>
+      <p:sp>
+        <p:nvSpPr>
+          <p:cNvPr id="8" name="TextBox 7">
+            <a:extLst>
+              <a:ext uri="{FF2B5EF4-FFF2-40B4-BE49-F238E27FC236}">
+                <a16:creationId xmlns:a16="http://schemas.microsoft.com/office/drawing/2014/main" id="{5C5218E2-6137-DDFC-6C4F-7D1335006B66}"/>
+              </a:ext>
+            </a:extLst>
+          </p:cNvPr>
+          <p:cNvSpPr txBox="1"/>
+          <p:nvPr/>
+        </p:nvSpPr>
+        <p:spPr>
+          <a:xfrm>
+            <a:off x="245296" y="2112509"/>
+            <a:ext cx="5850704" cy="584775"/>
+          </a:xfrm>
+          <a:prstGeom prst="rect">
+            <a:avLst/>
+          </a:prstGeom>
+          <a:noFill/>
+        </p:spPr>
+        <p:txBody>
+          <a:bodyPr wrap="none" rtlCol="0">
+            <a:spAutoFit/>
+          </a:bodyPr>
+          <a:lstStyle/>
+          <a:p>
+            <a:r>
+              <a:rPr lang="en-US" sz="3200" b="1" dirty="0"/>
+              <a:t>You can modify anything but …</a:t>
+            </a:r>
+          </a:p>
+        </p:txBody>
+      </p:sp>
+      <p:sp>
+        <p:nvSpPr>
+          <p:cNvPr id="9" name="TextBox 8">
+            <a:extLst>
+              <a:ext uri="{FF2B5EF4-FFF2-40B4-BE49-F238E27FC236}">
+                <a16:creationId xmlns:a16="http://schemas.microsoft.com/office/drawing/2014/main" id="{DA8937F9-03AE-1C2D-0DAA-F598B051E85B}"/>
+              </a:ext>
+            </a:extLst>
+          </p:cNvPr>
+          <p:cNvSpPr txBox="1"/>
+          <p:nvPr/>
+        </p:nvSpPr>
+        <p:spPr>
+          <a:xfrm>
+            <a:off x="671516" y="2697284"/>
+            <a:ext cx="6299200" cy="2062103"/>
+          </a:xfrm>
+          <a:prstGeom prst="rect">
+            <a:avLst/>
+          </a:prstGeom>
+          <a:noFill/>
+        </p:spPr>
+        <p:txBody>
+          <a:bodyPr wrap="square" rtlCol="0">
+            <a:spAutoFit/>
+          </a:bodyPr>
+          <a:lstStyle/>
+          <a:p>
+            <a:pPr marL="285750" indent="-285750">
+              <a:buFont typeface="Arial" panose="020B0604020202020204" pitchFamily="34" charset="0"/>
+              <a:buChar char="•"/>
+            </a:pPr>
+            <a:r>
+              <a:rPr lang="en-US" sz="3200" dirty="0"/>
+              <a:t>Start out only modifying the parts in </a:t>
+            </a:r>
+            <a:r>
+              <a:rPr lang="en-US" sz="3200" dirty="0">
+                <a:highlight>
+                  <a:srgbClr val="FFFF00"/>
+                </a:highlight>
+              </a:rPr>
+              <a:t>yellow </a:t>
+            </a:r>
+            <a:r>
+              <a:rPr lang="en-US" sz="3200" dirty="0"/>
+              <a:t>(carefully)</a:t>
+            </a:r>
+          </a:p>
+          <a:p>
+            <a:pPr marL="285750" indent="-285750">
+              <a:buFont typeface="Arial" panose="020B0604020202020204" pitchFamily="34" charset="0"/>
+              <a:buChar char="•"/>
+            </a:pPr>
+            <a:endParaRPr lang="en-US" sz="3200" dirty="0">
+              <a:highlight>
+                <a:srgbClr val="FFFF00"/>
+              </a:highlight>
+            </a:endParaRPr>
+          </a:p>
+          <a:p>
+            <a:pPr marL="285750" indent="-285750">
+              <a:buFont typeface="Arial" panose="020B0604020202020204" pitchFamily="34" charset="0"/>
+              <a:buChar char="•"/>
+            </a:pPr>
+            <a:r>
+              <a:rPr lang="en-US" sz="3200" dirty="0"/>
+              <a:t>Leave </a:t>
+            </a:r>
+            <a:r>
+              <a:rPr lang="en-US" sz="3200" dirty="0">
+                <a:highlight>
+                  <a:srgbClr val="FF0000"/>
+                </a:highlight>
+              </a:rPr>
+              <a:t>red</a:t>
+            </a:r>
+            <a:r>
+              <a:rPr lang="en-US" sz="3200" dirty="0"/>
+              <a:t> sections alone</a:t>
+            </a:r>
+          </a:p>
+        </p:txBody>
+      </p:sp>
+      <p:sp>
+        <p:nvSpPr>
+          <p:cNvPr id="2" name="TextBox 1">
+            <a:extLst>
+              <a:ext uri="{FF2B5EF4-FFF2-40B4-BE49-F238E27FC236}">
+                <a16:creationId xmlns:a16="http://schemas.microsoft.com/office/drawing/2014/main" id="{32FBE5CB-7862-B8CD-6E4E-3F7E10440281}"/>
+              </a:ext>
+            </a:extLst>
+          </p:cNvPr>
+          <p:cNvSpPr txBox="1"/>
+          <p:nvPr/>
+        </p:nvSpPr>
+        <p:spPr>
+          <a:xfrm>
+            <a:off x="761120" y="251954"/>
+            <a:ext cx="5580630" cy="1015663"/>
+          </a:xfrm>
+          <a:prstGeom prst="rect">
+            <a:avLst/>
+          </a:prstGeom>
+          <a:noFill/>
+        </p:spPr>
+        <p:txBody>
+          <a:bodyPr wrap="none" rtlCol="0">
+            <a:spAutoFit/>
+          </a:bodyPr>
+          <a:lstStyle/>
+          <a:p>
+            <a:pPr algn="ctr"/>
+            <a:r>
+              <a:rPr lang="en-US" sz="3600" b="1" dirty="0"/>
+              <a:t>step0_master_processing</a:t>
+            </a:r>
+            <a:endParaRPr lang="en-US" sz="2400" b="1" dirty="0"/>
+          </a:p>
+          <a:p>
+            <a:pPr algn="ctr"/>
+            <a:r>
+              <a:rPr lang="en-US" sz="2400" dirty="0"/>
+              <a:t>controls everything</a:t>
+            </a:r>
+          </a:p>
+        </p:txBody>
+      </p:sp>
+    </p:spTree>
+    <p:extLst>
+      <p:ext uri="{BB962C8B-B14F-4D97-AF65-F5344CB8AC3E}">
+        <p14:creationId xmlns:p14="http://schemas.microsoft.com/office/powerpoint/2010/main" val="1757129447"/>
+      </p:ext>
+    </p:extLst>
+  </p:cSld>
+  <p:clrMapOvr>
+    <a:masterClrMapping/>
+  </p:clrMapOvr>
+</p:sld>
+</file>
+
+<file path=ppt/slides/slide3.xml><?xml version="1.0" encoding="utf-8"?>
 <p:sld xmlns:a="http://schemas.openxmlformats.org/drawingml/2006/main" xmlns:r="http://schemas.openxmlformats.org/officeDocument/2006/relationships" xmlns:p="http://schemas.openxmlformats.org/presentationml/2006/main">
   <p:cSld>
     <p:spTree>
@@ -6393,7 +7997,7 @@
                   <a:srgbClr val="FFFF00"/>
                 </a:highlight>
               </a:rPr>
-              <a:t>assign animal id</a:t>
+              <a:t>assign animal id </a:t>
             </a:r>
           </a:p>
           <a:p>
@@ -6584,7 +8188,7 @@
 </p:sld>
 </file>
 
-<file path=ppt/slides/slide3.xml><?xml version="1.0" encoding="utf-8"?>
+<file path=ppt/slides/slide4.xml><?xml version="1.0" encoding="utf-8"?>
 <p:sld xmlns:a="http://schemas.openxmlformats.org/drawingml/2006/main" xmlns:r="http://schemas.openxmlformats.org/officeDocument/2006/relationships" xmlns:p="http://schemas.openxmlformats.org/presentationml/2006/main">
   <p:cSld>
     <p:spTree>
@@ -7165,7 +8769,7 @@
 </p:sld>
 </file>
 
-<file path=ppt/slides/slide4.xml><?xml version="1.0" encoding="utf-8"?>
+<file path=ppt/slides/slide5.xml><?xml version="1.0" encoding="utf-8"?>
 <p:sld xmlns:a="http://schemas.openxmlformats.org/drawingml/2006/main" xmlns:r="http://schemas.openxmlformats.org/officeDocument/2006/relationships" xmlns:p="http://schemas.openxmlformats.org/presentationml/2006/main">
   <p:cSld>
     <p:spTree>
@@ -7611,7 +9215,7 @@
 </p:sld>
 </file>
 
-<file path=ppt/slides/slide5.xml><?xml version="1.0" encoding="utf-8"?>
+<file path=ppt/slides/slide6.xml><?xml version="1.0" encoding="utf-8"?>
 <p:sld xmlns:a="http://schemas.openxmlformats.org/drawingml/2006/main" xmlns:r="http://schemas.openxmlformats.org/officeDocument/2006/relationships" xmlns:p="http://schemas.openxmlformats.org/presentationml/2006/main">
   <p:cSld>
     <p:spTree>
@@ -8167,7 +9771,7 @@
 </p:sld>
 </file>
 
-<file path=ppt/slides/slide6.xml><?xml version="1.0" encoding="utf-8"?>
+<file path=ppt/slides/slide7.xml><?xml version="1.0" encoding="utf-8"?>
 <p:sld xmlns:a="http://schemas.openxmlformats.org/drawingml/2006/main" xmlns:r="http://schemas.openxmlformats.org/officeDocument/2006/relationships" xmlns:p="http://schemas.openxmlformats.org/presentationml/2006/main">
   <p:cSld>
     <p:spTree>
@@ -10293,7 +11897,7 @@
 </p:sld>
 </file>
 
-<file path=ppt/slides/slide7.xml><?xml version="1.0" encoding="utf-8"?>
+<file path=ppt/slides/slide8.xml><?xml version="1.0" encoding="utf-8"?>
 <p:sld xmlns:a="http://schemas.openxmlformats.org/drawingml/2006/main" xmlns:r="http://schemas.openxmlformats.org/officeDocument/2006/relationships" xmlns:p="http://schemas.openxmlformats.org/presentationml/2006/main">
   <p:cSld>
     <p:spTree>
@@ -12539,7 +14143,7 @@
 </p:sld>
 </file>
 
-<file path=ppt/slides/slide8.xml><?xml version="1.0" encoding="utf-8"?>
+<file path=ppt/slides/slide9.xml><?xml version="1.0" encoding="utf-8"?>
 <p:sld xmlns:a="http://schemas.openxmlformats.org/drawingml/2006/main" xmlns:r="http://schemas.openxmlformats.org/officeDocument/2006/relationships" xmlns:p="http://schemas.openxmlformats.org/presentationml/2006/main">
   <p:cSld>
     <p:spTree>
@@ -12947,6 +14551,10 @@
               <a:t>”</a:t>
             </a:r>
           </a:p>
+          <a:p>
+            <a:pPr algn="ctr"/>
+            <a:endParaRPr lang="en-US" dirty="0"/>
+          </a:p>
         </p:txBody>
       </p:sp>
       <p:sp>
@@ -13332,1171 +14940,72 @@
           </a:p>
         </p:txBody>
       </p:sp>
+      <p:sp>
+        <p:nvSpPr>
+          <p:cNvPr id="6" name="TextBox 5">
+            <a:extLst>
+              <a:ext uri="{FF2B5EF4-FFF2-40B4-BE49-F238E27FC236}">
+                <a16:creationId xmlns:a16="http://schemas.microsoft.com/office/drawing/2014/main" id="{0E0DB0F5-5440-D2A9-4434-0DD6EC67B335}"/>
+              </a:ext>
+            </a:extLst>
+          </p:cNvPr>
+          <p:cNvSpPr txBox="1"/>
+          <p:nvPr/>
+        </p:nvSpPr>
+        <p:spPr>
+          <a:xfrm>
+            <a:off x="897827" y="3523594"/>
+            <a:ext cx="2203680" cy="461665"/>
+          </a:xfrm>
+          <a:prstGeom prst="rect">
+            <a:avLst/>
+          </a:prstGeom>
+          <a:noFill/>
+        </p:spPr>
+        <p:txBody>
+          <a:bodyPr wrap="none" rtlCol="0">
+            <a:spAutoFit/>
+          </a:bodyPr>
+          <a:lstStyle/>
+          <a:p>
+            <a:r>
+              <a:rPr lang="en-US" sz="1200" dirty="0">
+                <a:solidFill>
+                  <a:srgbClr val="0000FF"/>
+                </a:solidFill>
+              </a:rPr>
+              <a:t>(</a:t>
+            </a:r>
+            <a:r>
+              <a:rPr lang="en-US" sz="1200" dirty="0" err="1">
+                <a:solidFill>
+                  <a:srgbClr val="0000FF"/>
+                </a:solidFill>
+              </a:rPr>
+              <a:t>source_file_path</a:t>
+            </a:r>
+            <a:r>
+              <a:rPr lang="en-US" sz="1200" dirty="0">
+                <a:solidFill>
+                  <a:srgbClr val="0000FF"/>
+                </a:solidFill>
+              </a:rPr>
+              <a:t>  + ID + BDAT)</a:t>
+            </a:r>
+          </a:p>
+          <a:p>
+            <a:endParaRPr lang="en-US" sz="1200" dirty="0">
+              <a:solidFill>
+                <a:srgbClr val="0000FF"/>
+              </a:solidFill>
+            </a:endParaRPr>
+          </a:p>
+        </p:txBody>
+      </p:sp>
     </p:spTree>
     <p:extLst>
       <p:ext uri="{BB962C8B-B14F-4D97-AF65-F5344CB8AC3E}">
         <p14:creationId xmlns:p14="http://schemas.microsoft.com/office/powerpoint/2010/main" val="3461589913"/>
-      </p:ext>
-    </p:extLst>
-  </p:cSld>
-  <p:clrMapOvr>
-    <a:masterClrMapping/>
-  </p:clrMapOvr>
-</p:sld>
-</file>
-
-<file path=ppt/slides/slide9.xml><?xml version="1.0" encoding="utf-8"?>
-<p:sld xmlns:a="http://schemas.openxmlformats.org/drawingml/2006/main" xmlns:r="http://schemas.openxmlformats.org/officeDocument/2006/relationships" xmlns:p="http://schemas.openxmlformats.org/presentationml/2006/main">
-  <p:cSld>
-    <p:spTree>
-      <p:nvGrpSpPr>
-        <p:cNvPr id="1" name="">
-          <a:extLst>
-            <a:ext uri="{FF2B5EF4-FFF2-40B4-BE49-F238E27FC236}">
-              <a16:creationId xmlns:a16="http://schemas.microsoft.com/office/drawing/2014/main" id="{B4095AB1-CD7A-1FCC-3056-D158420871B2}"/>
-            </a:ext>
-          </a:extLst>
-        </p:cNvPr>
-        <p:cNvGrpSpPr/>
-        <p:nvPr/>
-      </p:nvGrpSpPr>
-      <p:grpSpPr>
-        <a:xfrm>
-          <a:off x="0" y="0"/>
-          <a:ext cx="0" cy="0"/>
-          <a:chOff x="0" y="0"/>
-          <a:chExt cx="0" cy="0"/>
-        </a:xfrm>
-      </p:grpSpPr>
-      <p:sp>
-        <p:nvSpPr>
-          <p:cNvPr id="9" name="Rectangle 8">
-            <a:extLst>
-              <a:ext uri="{FF2B5EF4-FFF2-40B4-BE49-F238E27FC236}">
-                <a16:creationId xmlns:a16="http://schemas.microsoft.com/office/drawing/2014/main" id="{C935488D-FA67-3C31-5851-38267BE1CA56}"/>
-              </a:ext>
-            </a:extLst>
-          </p:cNvPr>
-          <p:cNvSpPr/>
-          <p:nvPr/>
-        </p:nvSpPr>
-        <p:spPr>
-          <a:xfrm>
-            <a:off x="100678" y="2684928"/>
-            <a:ext cx="11971347" cy="1581310"/>
-          </a:xfrm>
-          <a:prstGeom prst="rect">
-            <a:avLst/>
-          </a:prstGeom>
-        </p:spPr>
-        <p:style>
-          <a:lnRef idx="2">
-            <a:schemeClr val="accent1">
-              <a:shade val="15000"/>
-            </a:schemeClr>
-          </a:lnRef>
-          <a:fillRef idx="1">
-            <a:schemeClr val="accent1"/>
-          </a:fillRef>
-          <a:effectRef idx="0">
-            <a:schemeClr val="accent1"/>
-          </a:effectRef>
-          <a:fontRef idx="minor">
-            <a:schemeClr val="lt1"/>
-          </a:fontRef>
-        </p:style>
-        <p:txBody>
-          <a:bodyPr rtlCol="0" anchor="ctr"/>
-          <a:lstStyle/>
-          <a:p>
-            <a:pPr algn="ctr"/>
-            <a:endParaRPr lang="en-US" dirty="0"/>
-          </a:p>
-        </p:txBody>
-      </p:sp>
-      <p:sp>
-        <p:nvSpPr>
-          <p:cNvPr id="4" name="Rectangle 3">
-            <a:extLst>
-              <a:ext uri="{FF2B5EF4-FFF2-40B4-BE49-F238E27FC236}">
-                <a16:creationId xmlns:a16="http://schemas.microsoft.com/office/drawing/2014/main" id="{EFCC18C3-C828-88CA-2ADE-F21B0848FB42}"/>
-              </a:ext>
-            </a:extLst>
-          </p:cNvPr>
-          <p:cNvSpPr/>
-          <p:nvPr/>
-        </p:nvSpPr>
-        <p:spPr>
-          <a:xfrm>
-            <a:off x="100679" y="972766"/>
-            <a:ext cx="11971347" cy="1581310"/>
-          </a:xfrm>
-          <a:prstGeom prst="rect">
-            <a:avLst/>
-          </a:prstGeom>
-        </p:spPr>
-        <p:style>
-          <a:lnRef idx="2">
-            <a:schemeClr val="accent1">
-              <a:shade val="15000"/>
-            </a:schemeClr>
-          </a:lnRef>
-          <a:fillRef idx="1">
-            <a:schemeClr val="accent1"/>
-          </a:fillRef>
-          <a:effectRef idx="0">
-            <a:schemeClr val="accent1"/>
-          </a:effectRef>
-          <a:fontRef idx="minor">
-            <a:schemeClr val="lt1"/>
-          </a:fontRef>
-        </p:style>
-        <p:txBody>
-          <a:bodyPr rtlCol="0" anchor="ctr"/>
-          <a:lstStyle/>
-          <a:p>
-            <a:pPr algn="ctr"/>
-            <a:endParaRPr lang="en-US"/>
-          </a:p>
-        </p:txBody>
-      </p:sp>
-      <p:graphicFrame>
-        <p:nvGraphicFramePr>
-          <p:cNvPr id="2" name="Table 1">
-            <a:extLst>
-              <a:ext uri="{FF2B5EF4-FFF2-40B4-BE49-F238E27FC236}">
-                <a16:creationId xmlns:a16="http://schemas.microsoft.com/office/drawing/2014/main" id="{88A41462-D606-07E0-F1D3-783C265B7E3C}"/>
-              </a:ext>
-            </a:extLst>
-          </p:cNvPr>
-          <p:cNvGraphicFramePr>
-            <a:graphicFrameLocks noGrp="1"/>
-          </p:cNvGraphicFramePr>
-          <p:nvPr/>
-        </p:nvGraphicFramePr>
-        <p:xfrm>
-          <a:off x="1712065" y="1233818"/>
-          <a:ext cx="8394969" cy="1112520"/>
-        </p:xfrm>
-        <a:graphic>
-          <a:graphicData uri="http://schemas.openxmlformats.org/drawingml/2006/table">
-            <a:tbl>
-              <a:tblPr firstRow="1" bandRow="1">
-                <a:tableStyleId>{073A0DAA-6AF3-43AB-8588-CEC1D06C72B9}</a:tableStyleId>
-              </a:tblPr>
-              <a:tblGrid>
-                <a:gridCol w="1021405">
-                  <a:extLst>
-                    <a:ext uri="{9D8B030D-6E8A-4147-A177-3AD203B41FA5}">
-                      <a16:colId xmlns:a16="http://schemas.microsoft.com/office/drawing/2014/main" val="1757777607"/>
-                    </a:ext>
-                  </a:extLst>
-                </a:gridCol>
-                <a:gridCol w="690664">
-                  <a:extLst>
-                    <a:ext uri="{9D8B030D-6E8A-4147-A177-3AD203B41FA5}">
-                      <a16:colId xmlns:a16="http://schemas.microsoft.com/office/drawing/2014/main" val="1794545505"/>
-                    </a:ext>
-                  </a:extLst>
-                </a:gridCol>
-                <a:gridCol w="1118681">
-                  <a:extLst>
-                    <a:ext uri="{9D8B030D-6E8A-4147-A177-3AD203B41FA5}">
-                      <a16:colId xmlns:a16="http://schemas.microsoft.com/office/drawing/2014/main" val="2055577220"/>
-                    </a:ext>
-                  </a:extLst>
-                </a:gridCol>
-                <a:gridCol w="5564219">
-                  <a:extLst>
-                    <a:ext uri="{9D8B030D-6E8A-4147-A177-3AD203B41FA5}">
-                      <a16:colId xmlns:a16="http://schemas.microsoft.com/office/drawing/2014/main" val="479773502"/>
-                    </a:ext>
-                  </a:extLst>
-                </a:gridCol>
-              </a:tblGrid>
-              <a:tr h="370840">
-                <a:tc>
-                  <a:txBody>
-                    <a:bodyPr/>
-                    <a:lstStyle/>
-                    <a:p>
-                      <a:r>
-                        <a:rPr lang="en-US" dirty="0"/>
-                        <a:t>Animal</a:t>
-                      </a:r>
-                    </a:p>
-                  </a:txBody>
-                  <a:tcPr/>
-                </a:tc>
-                <a:tc>
-                  <a:txBody>
-                    <a:bodyPr/>
-                    <a:lstStyle/>
-                    <a:p>
-                      <a:r>
-                        <a:rPr lang="en-US" dirty="0"/>
-                        <a:t>Date</a:t>
-                      </a:r>
-                    </a:p>
-                  </a:txBody>
-                  <a:tcPr/>
-                </a:tc>
-                <a:tc>
-                  <a:txBody>
-                    <a:bodyPr/>
-                    <a:lstStyle/>
-                    <a:p>
-                      <a:r>
-                        <a:rPr lang="en-US" dirty="0"/>
-                        <a:t>Location</a:t>
-                      </a:r>
-                    </a:p>
-                  </a:txBody>
-                  <a:tcPr/>
-                </a:tc>
-                <a:tc>
-                  <a:txBody>
-                    <a:bodyPr/>
-                    <a:lstStyle/>
-                    <a:p>
-                      <a:r>
-                        <a:rPr lang="en-US" dirty="0"/>
-                        <a:t>Description  (</a:t>
-                      </a:r>
-                      <a:r>
-                        <a:rPr lang="en-US" dirty="0" err="1"/>
-                        <a:t>lact</a:t>
-                      </a:r>
-                      <a:r>
-                        <a:rPr lang="en-US" dirty="0"/>
-                        <a:t>, event, remark, protocol, </a:t>
-                      </a:r>
-                      <a:r>
-                        <a:rPr lang="en-US" dirty="0" err="1"/>
-                        <a:t>etc</a:t>
-                      </a:r>
-                      <a:r>
-                        <a:rPr lang="en-US" dirty="0"/>
-                        <a:t>)</a:t>
-                      </a:r>
-                    </a:p>
-                  </a:txBody>
-                  <a:tcPr/>
-                </a:tc>
-                <a:extLst>
-                  <a:ext uri="{0D108BD9-81ED-4DB2-BD59-A6C34878D82A}">
-                    <a16:rowId xmlns:a16="http://schemas.microsoft.com/office/drawing/2014/main" val="209182417"/>
-                  </a:ext>
-                </a:extLst>
-              </a:tr>
-              <a:tr h="370840">
-                <a:tc>
-                  <a:txBody>
-                    <a:bodyPr/>
-                    <a:lstStyle/>
-                    <a:p>
-                      <a:endParaRPr lang="en-US" dirty="0"/>
-                    </a:p>
-                  </a:txBody>
-                  <a:tcPr/>
-                </a:tc>
-                <a:tc>
-                  <a:txBody>
-                    <a:bodyPr/>
-                    <a:lstStyle/>
-                    <a:p>
-                      <a:endParaRPr lang="en-US" dirty="0"/>
-                    </a:p>
-                  </a:txBody>
-                  <a:tcPr/>
-                </a:tc>
-                <a:tc>
-                  <a:txBody>
-                    <a:bodyPr/>
-                    <a:lstStyle/>
-                    <a:p>
-                      <a:endParaRPr lang="en-US" dirty="0"/>
-                    </a:p>
-                  </a:txBody>
-                  <a:tcPr/>
-                </a:tc>
-                <a:tc>
-                  <a:txBody>
-                    <a:bodyPr/>
-                    <a:lstStyle/>
-                    <a:p>
-                      <a:endParaRPr lang="en-US" dirty="0"/>
-                    </a:p>
-                  </a:txBody>
-                  <a:tcPr/>
-                </a:tc>
-                <a:extLst>
-                  <a:ext uri="{0D108BD9-81ED-4DB2-BD59-A6C34878D82A}">
-                    <a16:rowId xmlns:a16="http://schemas.microsoft.com/office/drawing/2014/main" val="2461913732"/>
-                  </a:ext>
-                </a:extLst>
-              </a:tr>
-              <a:tr h="370840">
-                <a:tc>
-                  <a:txBody>
-                    <a:bodyPr/>
-                    <a:lstStyle/>
-                    <a:p>
-                      <a:endParaRPr lang="en-US" dirty="0"/>
-                    </a:p>
-                  </a:txBody>
-                  <a:tcPr/>
-                </a:tc>
-                <a:tc>
-                  <a:txBody>
-                    <a:bodyPr/>
-                    <a:lstStyle/>
-                    <a:p>
-                      <a:endParaRPr lang="en-US" dirty="0"/>
-                    </a:p>
-                  </a:txBody>
-                  <a:tcPr/>
-                </a:tc>
-                <a:tc>
-                  <a:txBody>
-                    <a:bodyPr/>
-                    <a:lstStyle/>
-                    <a:p>
-                      <a:endParaRPr lang="en-US" dirty="0"/>
-                    </a:p>
-                  </a:txBody>
-                  <a:tcPr/>
-                </a:tc>
-                <a:tc>
-                  <a:txBody>
-                    <a:bodyPr/>
-                    <a:lstStyle/>
-                    <a:p>
-                      <a:endParaRPr lang="en-US" dirty="0"/>
-                    </a:p>
-                  </a:txBody>
-                  <a:tcPr/>
-                </a:tc>
-                <a:extLst>
-                  <a:ext uri="{0D108BD9-81ED-4DB2-BD59-A6C34878D82A}">
-                    <a16:rowId xmlns:a16="http://schemas.microsoft.com/office/drawing/2014/main" val="2618388061"/>
-                  </a:ext>
-                </a:extLst>
-              </a:tr>
-            </a:tbl>
-          </a:graphicData>
-        </a:graphic>
-      </p:graphicFrame>
-      <p:sp>
-        <p:nvSpPr>
-          <p:cNvPr id="3" name="TextBox 2">
-            <a:extLst>
-              <a:ext uri="{FF2B5EF4-FFF2-40B4-BE49-F238E27FC236}">
-                <a16:creationId xmlns:a16="http://schemas.microsoft.com/office/drawing/2014/main" id="{CBBEE4C1-ED4B-C4C9-2A77-94427C97BBAF}"/>
-              </a:ext>
-            </a:extLst>
-          </p:cNvPr>
-          <p:cNvSpPr txBox="1"/>
-          <p:nvPr/>
-        </p:nvSpPr>
-        <p:spPr>
-          <a:xfrm>
-            <a:off x="119974" y="1230971"/>
-            <a:ext cx="1438792" cy="923330"/>
-          </a:xfrm>
-          <a:prstGeom prst="rect">
-            <a:avLst/>
-          </a:prstGeom>
-          <a:noFill/>
-        </p:spPr>
-        <p:txBody>
-          <a:bodyPr wrap="none" rtlCol="0">
-            <a:spAutoFit/>
-          </a:bodyPr>
-          <a:lstStyle/>
-          <a:p>
-            <a:pPr algn="ctr"/>
-            <a:r>
-              <a:rPr lang="en-US" dirty="0"/>
-              <a:t>Event </a:t>
-            </a:r>
-          </a:p>
-          <a:p>
-            <a:pPr algn="ctr"/>
-            <a:r>
-              <a:rPr lang="en-US" dirty="0"/>
-              <a:t>Data</a:t>
-            </a:r>
-          </a:p>
-          <a:p>
-            <a:pPr algn="ctr"/>
-            <a:r>
-              <a:rPr lang="en-US" dirty="0"/>
-              <a:t>(last 5 years)</a:t>
-            </a:r>
-          </a:p>
-        </p:txBody>
-      </p:sp>
-      <p:sp>
-        <p:nvSpPr>
-          <p:cNvPr id="5" name="TextBox 4">
-            <a:extLst>
-              <a:ext uri="{FF2B5EF4-FFF2-40B4-BE49-F238E27FC236}">
-                <a16:creationId xmlns:a16="http://schemas.microsoft.com/office/drawing/2014/main" id="{2F692F79-9CBB-EADB-DBED-E9437853B071}"/>
-              </a:ext>
-            </a:extLst>
-          </p:cNvPr>
-          <p:cNvSpPr txBox="1"/>
-          <p:nvPr/>
-        </p:nvSpPr>
-        <p:spPr>
-          <a:xfrm>
-            <a:off x="4708187" y="312376"/>
-            <a:ext cx="2332433" cy="369332"/>
-          </a:xfrm>
-          <a:prstGeom prst="rect">
-            <a:avLst/>
-          </a:prstGeom>
-          <a:noFill/>
-        </p:spPr>
-        <p:txBody>
-          <a:bodyPr wrap="none" rtlCol="0">
-            <a:spAutoFit/>
-          </a:bodyPr>
-          <a:lstStyle/>
-          <a:p>
-            <a:r>
-              <a:rPr lang="en-US" dirty="0"/>
-              <a:t>Dairy Data Base Files </a:t>
-            </a:r>
-          </a:p>
-        </p:txBody>
-      </p:sp>
-      <p:sp>
-        <p:nvSpPr>
-          <p:cNvPr id="7" name="Oval 6">
-            <a:extLst>
-              <a:ext uri="{FF2B5EF4-FFF2-40B4-BE49-F238E27FC236}">
-                <a16:creationId xmlns:a16="http://schemas.microsoft.com/office/drawing/2014/main" id="{C2D1376C-06D6-2B6B-4DFD-1FA61552DED7}"/>
-              </a:ext>
-            </a:extLst>
-          </p:cNvPr>
-          <p:cNvSpPr/>
-          <p:nvPr/>
-        </p:nvSpPr>
-        <p:spPr>
-          <a:xfrm>
-            <a:off x="410903" y="3058097"/>
-            <a:ext cx="2021013" cy="744373"/>
-          </a:xfrm>
-          <a:prstGeom prst="ellipse">
-            <a:avLst/>
-          </a:prstGeom>
-          <a:solidFill>
-            <a:schemeClr val="tx1"/>
-          </a:solidFill>
-        </p:spPr>
-        <p:style>
-          <a:lnRef idx="2">
-            <a:schemeClr val="accent1">
-              <a:shade val="15000"/>
-            </a:schemeClr>
-          </a:lnRef>
-          <a:fillRef idx="1">
-            <a:schemeClr val="accent1"/>
-          </a:fillRef>
-          <a:effectRef idx="0">
-            <a:schemeClr val="accent1"/>
-          </a:effectRef>
-          <a:fontRef idx="minor">
-            <a:schemeClr val="lt1"/>
-          </a:fontRef>
-        </p:style>
-        <p:txBody>
-          <a:bodyPr rtlCol="0" anchor="ctr"/>
-          <a:lstStyle/>
-          <a:p>
-            <a:pPr algn="ctr"/>
-            <a:r>
-              <a:rPr lang="en-US" b="1" dirty="0"/>
-              <a:t>Unique Animal</a:t>
-            </a:r>
-          </a:p>
-        </p:txBody>
-      </p:sp>
-      <p:sp>
-        <p:nvSpPr>
-          <p:cNvPr id="12" name="TextBox 11">
-            <a:extLst>
-              <a:ext uri="{FF2B5EF4-FFF2-40B4-BE49-F238E27FC236}">
-                <a16:creationId xmlns:a16="http://schemas.microsoft.com/office/drawing/2014/main" id="{425E4041-45B0-16DD-C45E-04FBE1F809FB}"/>
-              </a:ext>
-            </a:extLst>
-          </p:cNvPr>
-          <p:cNvSpPr txBox="1"/>
-          <p:nvPr/>
-        </p:nvSpPr>
-        <p:spPr>
-          <a:xfrm>
-            <a:off x="2619082" y="2875418"/>
-            <a:ext cx="6067718" cy="1200329"/>
-          </a:xfrm>
-          <a:prstGeom prst="rect">
-            <a:avLst/>
-          </a:prstGeom>
-          <a:solidFill>
-            <a:schemeClr val="bg1"/>
-          </a:solidFill>
-        </p:spPr>
-        <p:txBody>
-          <a:bodyPr wrap="square" rtlCol="0">
-            <a:spAutoFit/>
-          </a:bodyPr>
-          <a:lstStyle/>
-          <a:p>
-            <a:r>
-              <a:rPr lang="en-US" dirty="0"/>
-              <a:t>Animal Properties: “</a:t>
-            </a:r>
-            <a:r>
-              <a:rPr lang="en-US" dirty="0" err="1"/>
-              <a:t>id_animal</a:t>
-            </a:r>
-            <a:r>
-              <a:rPr lang="en-US" dirty="0"/>
-              <a:t>”, “breed”, </a:t>
-            </a:r>
-          </a:p>
-          <a:p>
-            <a:r>
-              <a:rPr lang="en-US" dirty="0"/>
-              <a:t>                                         “</a:t>
-            </a:r>
-            <a:r>
-              <a:rPr lang="en-US" dirty="0" err="1"/>
-              <a:t>date_birth</a:t>
-            </a:r>
-            <a:r>
-              <a:rPr lang="en-US" dirty="0"/>
-              <a:t>”, “</a:t>
-            </a:r>
-            <a:r>
-              <a:rPr lang="en-US" dirty="0" err="1"/>
-              <a:t>date_died</a:t>
-            </a:r>
-            <a:r>
-              <a:rPr lang="en-US" dirty="0"/>
-              <a:t>”, “</a:t>
-            </a:r>
-            <a:r>
-              <a:rPr lang="en-US" dirty="0" err="1"/>
-              <a:t>date_sold</a:t>
-            </a:r>
-            <a:r>
-              <a:rPr lang="en-US" dirty="0"/>
-              <a:t>”, </a:t>
-            </a:r>
-          </a:p>
-          <a:p>
-            <a:r>
-              <a:rPr lang="en-US" dirty="0"/>
-              <a:t>                                         “</a:t>
-            </a:r>
-            <a:r>
-              <a:rPr lang="en-US" i="1" dirty="0" err="1">
-                <a:solidFill>
-                  <a:schemeClr val="accent1"/>
-                </a:solidFill>
-              </a:rPr>
-              <a:t>date_enrolled</a:t>
-            </a:r>
-            <a:r>
-              <a:rPr lang="en-US" i="1" dirty="0">
-                <a:solidFill>
-                  <a:schemeClr val="accent1"/>
-                </a:solidFill>
-              </a:rPr>
-              <a:t>”, “</a:t>
-            </a:r>
-            <a:r>
-              <a:rPr lang="en-US" i="1" dirty="0" err="1">
-                <a:solidFill>
-                  <a:schemeClr val="accent1"/>
-                </a:solidFill>
-              </a:rPr>
-              <a:t>date_left</a:t>
-            </a:r>
-            <a:r>
-              <a:rPr lang="en-US" i="1" dirty="0">
-                <a:solidFill>
-                  <a:schemeClr val="accent1"/>
-                </a:solidFill>
-              </a:rPr>
-              <a:t>”,</a:t>
-            </a:r>
-          </a:p>
-          <a:p>
-            <a:r>
-              <a:rPr lang="en-US" i="1" dirty="0">
-                <a:solidFill>
-                  <a:schemeClr val="accent1"/>
-                </a:solidFill>
-              </a:rPr>
-              <a:t>                                         “</a:t>
-            </a:r>
-            <a:r>
-              <a:rPr lang="en-US" i="1" dirty="0" err="1">
-                <a:solidFill>
-                  <a:schemeClr val="accent1"/>
-                </a:solidFill>
-              </a:rPr>
-              <a:t>age_enrolled</a:t>
-            </a:r>
-            <a:r>
-              <a:rPr lang="en-US" i="1" dirty="0">
-                <a:solidFill>
-                  <a:schemeClr val="accent1"/>
-                </a:solidFill>
-              </a:rPr>
-              <a:t>”, “</a:t>
-            </a:r>
-            <a:r>
-              <a:rPr lang="en-US" i="1" dirty="0" err="1">
-                <a:solidFill>
-                  <a:schemeClr val="accent1"/>
-                </a:solidFill>
-              </a:rPr>
-              <a:t>age_left</a:t>
-            </a:r>
-            <a:r>
-              <a:rPr lang="en-US" i="1" dirty="0">
-                <a:solidFill>
-                  <a:schemeClr val="accent1"/>
-                </a:solidFill>
-              </a:rPr>
-              <a:t>”</a:t>
-            </a:r>
-          </a:p>
-        </p:txBody>
-      </p:sp>
-      <p:sp>
-        <p:nvSpPr>
-          <p:cNvPr id="6" name="Rectangle 5">
-            <a:extLst>
-              <a:ext uri="{FF2B5EF4-FFF2-40B4-BE49-F238E27FC236}">
-                <a16:creationId xmlns:a16="http://schemas.microsoft.com/office/drawing/2014/main" id="{09DC2DC1-F746-2C59-832A-42B1FE22994D}"/>
-              </a:ext>
-            </a:extLst>
-          </p:cNvPr>
-          <p:cNvSpPr/>
-          <p:nvPr/>
-        </p:nvSpPr>
-        <p:spPr>
-          <a:xfrm>
-            <a:off x="10189721" y="1420607"/>
-            <a:ext cx="1799617" cy="1073830"/>
-          </a:xfrm>
-          <a:prstGeom prst="rect">
-            <a:avLst/>
-          </a:prstGeom>
-          <a:solidFill>
-            <a:srgbClr val="C00000"/>
-          </a:solidFill>
-        </p:spPr>
-        <p:style>
-          <a:lnRef idx="2">
-            <a:schemeClr val="accent1">
-              <a:shade val="15000"/>
-            </a:schemeClr>
-          </a:lnRef>
-          <a:fillRef idx="1">
-            <a:schemeClr val="accent1"/>
-          </a:fillRef>
-          <a:effectRef idx="0">
-            <a:schemeClr val="accent1"/>
-          </a:effectRef>
-          <a:fontRef idx="minor">
-            <a:schemeClr val="lt1"/>
-          </a:fontRef>
-        </p:style>
-        <p:txBody>
-          <a:bodyPr rtlCol="0" anchor="ctr"/>
-          <a:lstStyle/>
-          <a:p>
-            <a:pPr algn="ctr"/>
-            <a:r>
-              <a:rPr lang="en-US" b="1" dirty="0" err="1"/>
-              <a:t>events.parquet</a:t>
-            </a:r>
-            <a:endParaRPr lang="en-US" b="1" dirty="0"/>
-          </a:p>
-          <a:p>
-            <a:pPr algn="ctr"/>
-            <a:r>
-              <a:rPr lang="en-US" sz="1200" dirty="0"/>
-              <a:t>Each row is an event</a:t>
-            </a:r>
-          </a:p>
-        </p:txBody>
-      </p:sp>
-      <p:sp>
-        <p:nvSpPr>
-          <p:cNvPr id="14" name="Rectangle 13">
-            <a:extLst>
-              <a:ext uri="{FF2B5EF4-FFF2-40B4-BE49-F238E27FC236}">
-                <a16:creationId xmlns:a16="http://schemas.microsoft.com/office/drawing/2014/main" id="{0FA4F44E-AB45-CB00-8D13-696B1B04C53D}"/>
-              </a:ext>
-            </a:extLst>
-          </p:cNvPr>
-          <p:cNvSpPr/>
-          <p:nvPr/>
-        </p:nvSpPr>
-        <p:spPr>
-          <a:xfrm>
-            <a:off x="9572917" y="3243124"/>
-            <a:ext cx="2208179" cy="464915"/>
-          </a:xfrm>
-          <a:prstGeom prst="rect">
-            <a:avLst/>
-          </a:prstGeom>
-          <a:solidFill>
-            <a:srgbClr val="C00000"/>
-          </a:solidFill>
-        </p:spPr>
-        <p:style>
-          <a:lnRef idx="2">
-            <a:schemeClr val="accent1">
-              <a:shade val="15000"/>
-            </a:schemeClr>
-          </a:lnRef>
-          <a:fillRef idx="1">
-            <a:schemeClr val="accent1"/>
-          </a:fillRef>
-          <a:effectRef idx="0">
-            <a:schemeClr val="accent1"/>
-          </a:effectRef>
-          <a:fontRef idx="minor">
-            <a:schemeClr val="lt1"/>
-          </a:fontRef>
-        </p:style>
-        <p:txBody>
-          <a:bodyPr rtlCol="0" anchor="ctr"/>
-          <a:lstStyle/>
-          <a:p>
-            <a:pPr algn="ctr"/>
-            <a:r>
-              <a:rPr lang="en-US" b="1" dirty="0" err="1"/>
-              <a:t>animals.parquet</a:t>
-            </a:r>
-            <a:endParaRPr lang="en-US" b="1" dirty="0"/>
-          </a:p>
-          <a:p>
-            <a:pPr algn="ctr"/>
-            <a:r>
-              <a:rPr lang="en-US" sz="1200" b="1" dirty="0"/>
-              <a:t>Each row is a unique animal</a:t>
-            </a:r>
-          </a:p>
-        </p:txBody>
-      </p:sp>
-      <p:sp>
-        <p:nvSpPr>
-          <p:cNvPr id="15" name="Rectangle 14">
-            <a:extLst>
-              <a:ext uri="{FF2B5EF4-FFF2-40B4-BE49-F238E27FC236}">
-                <a16:creationId xmlns:a16="http://schemas.microsoft.com/office/drawing/2014/main" id="{07AE5C18-B772-8D05-55B6-EE022DFAD61B}"/>
-              </a:ext>
-            </a:extLst>
-          </p:cNvPr>
-          <p:cNvSpPr/>
-          <p:nvPr/>
-        </p:nvSpPr>
-        <p:spPr>
-          <a:xfrm>
-            <a:off x="119974" y="4545394"/>
-            <a:ext cx="11971347" cy="1865133"/>
-          </a:xfrm>
-          <a:prstGeom prst="rect">
-            <a:avLst/>
-          </a:prstGeom>
-        </p:spPr>
-        <p:style>
-          <a:lnRef idx="2">
-            <a:schemeClr val="accent1">
-              <a:shade val="15000"/>
-            </a:schemeClr>
-          </a:lnRef>
-          <a:fillRef idx="1">
-            <a:schemeClr val="accent1"/>
-          </a:fillRef>
-          <a:effectRef idx="0">
-            <a:schemeClr val="accent1"/>
-          </a:effectRef>
-          <a:fontRef idx="minor">
-            <a:schemeClr val="lt1"/>
-          </a:fontRef>
-        </p:style>
-        <p:txBody>
-          <a:bodyPr rtlCol="0" anchor="ctr"/>
-          <a:lstStyle/>
-          <a:p>
-            <a:pPr algn="ctr"/>
-            <a:endParaRPr lang="en-US"/>
-          </a:p>
-        </p:txBody>
-      </p:sp>
-      <p:sp>
-        <p:nvSpPr>
-          <p:cNvPr id="16" name="Oval 15">
-            <a:extLst>
-              <a:ext uri="{FF2B5EF4-FFF2-40B4-BE49-F238E27FC236}">
-                <a16:creationId xmlns:a16="http://schemas.microsoft.com/office/drawing/2014/main" id="{65EE8DA0-6C67-A4BC-AD3F-1A31366F7B4F}"/>
-              </a:ext>
-            </a:extLst>
-          </p:cNvPr>
-          <p:cNvSpPr/>
-          <p:nvPr/>
-        </p:nvSpPr>
-        <p:spPr>
-          <a:xfrm>
-            <a:off x="119974" y="4591677"/>
-            <a:ext cx="2021013" cy="744373"/>
-          </a:xfrm>
-          <a:prstGeom prst="ellipse">
-            <a:avLst/>
-          </a:prstGeom>
-          <a:solidFill>
-            <a:schemeClr val="tx1"/>
-          </a:solidFill>
-        </p:spPr>
-        <p:style>
-          <a:lnRef idx="2">
-            <a:schemeClr val="accent1">
-              <a:shade val="15000"/>
-            </a:schemeClr>
-          </a:lnRef>
-          <a:fillRef idx="1">
-            <a:schemeClr val="accent1"/>
-          </a:fillRef>
-          <a:effectRef idx="0">
-            <a:schemeClr val="accent1"/>
-          </a:effectRef>
-          <a:fontRef idx="minor">
-            <a:schemeClr val="lt1"/>
-          </a:fontRef>
-        </p:style>
-        <p:txBody>
-          <a:bodyPr rtlCol="0" anchor="ctr"/>
-          <a:lstStyle/>
-          <a:p>
-            <a:pPr algn="ctr"/>
-            <a:r>
-              <a:rPr lang="en-US" b="1" dirty="0"/>
-              <a:t>Unique Animal</a:t>
-            </a:r>
-          </a:p>
-        </p:txBody>
-      </p:sp>
-      <p:sp>
-        <p:nvSpPr>
-          <p:cNvPr id="17" name="TextBox 16">
-            <a:extLst>
-              <a:ext uri="{FF2B5EF4-FFF2-40B4-BE49-F238E27FC236}">
-                <a16:creationId xmlns:a16="http://schemas.microsoft.com/office/drawing/2014/main" id="{CB48FC2A-7E09-DA21-9EF9-9F794A9A8CC3}"/>
-              </a:ext>
-            </a:extLst>
-          </p:cNvPr>
-          <p:cNvSpPr txBox="1"/>
-          <p:nvPr/>
-        </p:nvSpPr>
-        <p:spPr>
-          <a:xfrm>
-            <a:off x="2638377" y="4735885"/>
-            <a:ext cx="7838312" cy="1200329"/>
-          </a:xfrm>
-          <a:prstGeom prst="rect">
-            <a:avLst/>
-          </a:prstGeom>
-          <a:solidFill>
-            <a:schemeClr val="bg1"/>
-          </a:solidFill>
-        </p:spPr>
-        <p:txBody>
-          <a:bodyPr wrap="square" rtlCol="0">
-            <a:spAutoFit/>
-          </a:bodyPr>
-          <a:lstStyle/>
-          <a:p>
-            <a:r>
-              <a:rPr lang="en-US" dirty="0"/>
-              <a:t>Lactation Properties: “</a:t>
-            </a:r>
-            <a:r>
-              <a:rPr lang="en-US" dirty="0" err="1"/>
-              <a:t>id_animal</a:t>
-            </a:r>
-            <a:r>
-              <a:rPr lang="en-US" dirty="0"/>
-              <a:t>”, “</a:t>
-            </a:r>
-            <a:r>
-              <a:rPr lang="en-US" dirty="0" err="1"/>
-              <a:t>lact</a:t>
-            </a:r>
-            <a:r>
-              <a:rPr lang="en-US" dirty="0"/>
-              <a:t>”, “</a:t>
-            </a:r>
-            <a:r>
-              <a:rPr lang="en-US" dirty="0" err="1"/>
-              <a:t>lact_group</a:t>
-            </a:r>
-            <a:r>
-              <a:rPr lang="en-US" dirty="0"/>
-              <a:t>”,</a:t>
-            </a:r>
-          </a:p>
-          <a:p>
-            <a:r>
-              <a:rPr lang="en-US" dirty="0"/>
-              <a:t>                                              “</a:t>
-            </a:r>
-            <a:r>
-              <a:rPr lang="en-US" dirty="0" err="1"/>
-              <a:t>date_fresh</a:t>
-            </a:r>
-            <a:r>
-              <a:rPr lang="en-US" dirty="0"/>
-              <a:t>”, “</a:t>
-            </a:r>
-            <a:r>
-              <a:rPr lang="en-US" dirty="0" err="1"/>
-              <a:t>date_dry</a:t>
-            </a:r>
-            <a:r>
-              <a:rPr lang="en-US" dirty="0"/>
-              <a:t>”, “</a:t>
-            </a:r>
-            <a:r>
-              <a:rPr lang="en-US" dirty="0" err="1"/>
-              <a:t>date_next_fresh</a:t>
-            </a:r>
-            <a:r>
-              <a:rPr lang="en-US" dirty="0"/>
-              <a:t>”, </a:t>
-            </a:r>
-          </a:p>
-          <a:p>
-            <a:r>
-              <a:rPr lang="en-US" dirty="0"/>
-              <a:t>                                              </a:t>
-            </a:r>
-            <a:r>
-              <a:rPr lang="en-US" i="1" dirty="0">
-                <a:solidFill>
-                  <a:schemeClr val="accent1"/>
-                </a:solidFill>
-              </a:rPr>
-              <a:t>“</a:t>
-            </a:r>
-            <a:r>
-              <a:rPr lang="en-US" i="1" dirty="0" err="1">
-                <a:solidFill>
-                  <a:schemeClr val="accent1"/>
-                </a:solidFill>
-              </a:rPr>
-              <a:t>date_archived</a:t>
-            </a:r>
-            <a:r>
-              <a:rPr lang="en-US" i="1" dirty="0">
-                <a:solidFill>
-                  <a:schemeClr val="accent1"/>
-                </a:solidFill>
-              </a:rPr>
-              <a:t>”, “</a:t>
-            </a:r>
-            <a:r>
-              <a:rPr lang="en-US" i="1" dirty="0" err="1">
-                <a:solidFill>
-                  <a:schemeClr val="accent1"/>
-                </a:solidFill>
-              </a:rPr>
-              <a:t>dim_at_archive</a:t>
-            </a:r>
-            <a:r>
-              <a:rPr lang="en-US" i="1" dirty="0">
-                <a:solidFill>
-                  <a:schemeClr val="accent1"/>
-                </a:solidFill>
-              </a:rPr>
-              <a:t>”, “</a:t>
-            </a:r>
-            <a:r>
-              <a:rPr lang="en-US" i="1" dirty="0" err="1">
-                <a:solidFill>
-                  <a:schemeClr val="accent1"/>
-                </a:solidFill>
-              </a:rPr>
-              <a:t>age_at_archive</a:t>
-            </a:r>
-            <a:r>
-              <a:rPr lang="en-US" i="1" dirty="0">
-                <a:solidFill>
-                  <a:schemeClr val="accent1"/>
-                </a:solidFill>
-              </a:rPr>
-              <a:t>”</a:t>
-            </a:r>
-          </a:p>
-          <a:p>
-            <a:r>
-              <a:rPr lang="en-US" i="1" dirty="0">
-                <a:solidFill>
-                  <a:schemeClr val="accent1"/>
-                </a:solidFill>
-              </a:rPr>
-              <a:t>                                               “</a:t>
-            </a:r>
-            <a:r>
-              <a:rPr lang="en-US" i="1" dirty="0" err="1">
-                <a:solidFill>
-                  <a:schemeClr val="accent1"/>
-                </a:solidFill>
-              </a:rPr>
-              <a:t>date_dim</a:t>
-            </a:r>
-            <a:r>
-              <a:rPr lang="en-US" i="1" dirty="0">
-                <a:solidFill>
-                  <a:schemeClr val="accent1"/>
-                </a:solidFill>
-              </a:rPr>
-              <a:t>##”</a:t>
-            </a:r>
-          </a:p>
-        </p:txBody>
-      </p:sp>
-      <p:sp>
-        <p:nvSpPr>
-          <p:cNvPr id="18" name="Rectangle 17">
-            <a:extLst>
-              <a:ext uri="{FF2B5EF4-FFF2-40B4-BE49-F238E27FC236}">
-                <a16:creationId xmlns:a16="http://schemas.microsoft.com/office/drawing/2014/main" id="{F4286412-220C-8E0D-58C9-73A924CDA9F3}"/>
-              </a:ext>
-            </a:extLst>
-          </p:cNvPr>
-          <p:cNvSpPr/>
-          <p:nvPr/>
-        </p:nvSpPr>
-        <p:spPr>
-          <a:xfrm>
-            <a:off x="8686800" y="5699357"/>
-            <a:ext cx="3224717" cy="582339"/>
-          </a:xfrm>
-          <a:prstGeom prst="rect">
-            <a:avLst/>
-          </a:prstGeom>
-          <a:solidFill>
-            <a:srgbClr val="C00000"/>
-          </a:solidFill>
-        </p:spPr>
-        <p:style>
-          <a:lnRef idx="2">
-            <a:schemeClr val="accent1">
-              <a:shade val="15000"/>
-            </a:schemeClr>
-          </a:lnRef>
-          <a:fillRef idx="1">
-            <a:schemeClr val="accent1"/>
-          </a:fillRef>
-          <a:effectRef idx="0">
-            <a:schemeClr val="accent1"/>
-          </a:effectRef>
-          <a:fontRef idx="minor">
-            <a:schemeClr val="lt1"/>
-          </a:fontRef>
-        </p:style>
-        <p:txBody>
-          <a:bodyPr rtlCol="0" anchor="ctr"/>
-          <a:lstStyle/>
-          <a:p>
-            <a:pPr algn="ctr"/>
-            <a:r>
-              <a:rPr lang="en-US" b="1" dirty="0" err="1"/>
-              <a:t>animal_lactations.parquet</a:t>
-            </a:r>
-            <a:endParaRPr lang="en-US" b="1" dirty="0"/>
-          </a:p>
-          <a:p>
-            <a:pPr algn="ctr"/>
-            <a:r>
-              <a:rPr lang="en-US" sz="1200" b="1" dirty="0"/>
-              <a:t>Each row is a lactation</a:t>
-            </a:r>
-            <a:endParaRPr lang="en-US" dirty="0"/>
-          </a:p>
-        </p:txBody>
-      </p:sp>
-      <p:sp>
-        <p:nvSpPr>
-          <p:cNvPr id="8" name="Isosceles Triangle 7">
-            <a:extLst>
-              <a:ext uri="{FF2B5EF4-FFF2-40B4-BE49-F238E27FC236}">
-                <a16:creationId xmlns:a16="http://schemas.microsoft.com/office/drawing/2014/main" id="{EBC05ED7-F3D2-239D-EB94-68C7ACBF0052}"/>
-              </a:ext>
-            </a:extLst>
-          </p:cNvPr>
-          <p:cNvSpPr/>
-          <p:nvPr/>
-        </p:nvSpPr>
-        <p:spPr>
-          <a:xfrm>
-            <a:off x="634638" y="5105333"/>
-            <a:ext cx="2402732" cy="744372"/>
-          </a:xfrm>
-          <a:prstGeom prst="triangle">
-            <a:avLst/>
-          </a:prstGeom>
-          <a:solidFill>
-            <a:schemeClr val="tx1"/>
-          </a:solidFill>
-        </p:spPr>
-        <p:style>
-          <a:lnRef idx="2">
-            <a:schemeClr val="accent1">
-              <a:shade val="15000"/>
-            </a:schemeClr>
-          </a:lnRef>
-          <a:fillRef idx="1">
-            <a:schemeClr val="accent1"/>
-          </a:fillRef>
-          <a:effectRef idx="0">
-            <a:schemeClr val="accent1"/>
-          </a:effectRef>
-          <a:fontRef idx="minor">
-            <a:schemeClr val="lt1"/>
-          </a:fontRef>
-        </p:style>
-        <p:txBody>
-          <a:bodyPr rtlCol="0" anchor="ctr"/>
-          <a:lstStyle/>
-          <a:p>
-            <a:pPr algn="ctr"/>
-            <a:r>
-              <a:rPr lang="en-US" b="1" dirty="0"/>
-              <a:t>Time</a:t>
-            </a:r>
-          </a:p>
-          <a:p>
-            <a:pPr algn="ctr"/>
-            <a:endParaRPr lang="en-US" dirty="0"/>
-          </a:p>
-        </p:txBody>
-      </p:sp>
-    </p:spTree>
-    <p:extLst>
-      <p:ext uri="{BB962C8B-B14F-4D97-AF65-F5344CB8AC3E}">
-        <p14:creationId xmlns:p14="http://schemas.microsoft.com/office/powerpoint/2010/main" val="2507303409"/>
       </p:ext>
     </p:extLst>
   </p:cSld>

</xml_diff>

<commit_message>
cleaned up milestone stuff
</commit_message>
<xml_diff>
--- a/resources/DataProcessingDocumentation.pptx
+++ b/resources/DataProcessingDocumentation.pptx
@@ -230,7 +230,7 @@
           <a:p>
             <a:fld id="{A0EDB7BB-2F45-498B-BAA5-C7C8A1082E91}" type="datetimeFigureOut">
               <a:rPr lang="en-US" smtClean="0"/>
-              <a:t>10/18/2025</a:t>
+              <a:t>10/19/2025</a:t>
             </a:fld>
             <a:endParaRPr lang="en-US"/>
           </a:p>
@@ -1088,7 +1088,7 @@
           <a:p>
             <a:fld id="{1B31CA29-C2EB-451B-A0BB-9B4644E6EA20}" type="datetimeFigureOut">
               <a:rPr lang="en-US" smtClean="0"/>
-              <a:t>10/18/2025</a:t>
+              <a:t>10/19/2025</a:t>
             </a:fld>
             <a:endParaRPr lang="en-US"/>
           </a:p>
@@ -1286,7 +1286,7 @@
           <a:p>
             <a:fld id="{1B31CA29-C2EB-451B-A0BB-9B4644E6EA20}" type="datetimeFigureOut">
               <a:rPr lang="en-US" smtClean="0"/>
-              <a:t>10/18/2025</a:t>
+              <a:t>10/19/2025</a:t>
             </a:fld>
             <a:endParaRPr lang="en-US"/>
           </a:p>
@@ -1494,7 +1494,7 @@
           <a:p>
             <a:fld id="{1B31CA29-C2EB-451B-A0BB-9B4644E6EA20}" type="datetimeFigureOut">
               <a:rPr lang="en-US" smtClean="0"/>
-              <a:t>10/18/2025</a:t>
+              <a:t>10/19/2025</a:t>
             </a:fld>
             <a:endParaRPr lang="en-US"/>
           </a:p>
@@ -1692,7 +1692,7 @@
           <a:p>
             <a:fld id="{1B31CA29-C2EB-451B-A0BB-9B4644E6EA20}" type="datetimeFigureOut">
               <a:rPr lang="en-US" smtClean="0"/>
-              <a:t>10/18/2025</a:t>
+              <a:t>10/19/2025</a:t>
             </a:fld>
             <a:endParaRPr lang="en-US"/>
           </a:p>
@@ -1967,7 +1967,7 @@
           <a:p>
             <a:fld id="{1B31CA29-C2EB-451B-A0BB-9B4644E6EA20}" type="datetimeFigureOut">
               <a:rPr lang="en-US" smtClean="0"/>
-              <a:t>10/18/2025</a:t>
+              <a:t>10/19/2025</a:t>
             </a:fld>
             <a:endParaRPr lang="en-US"/>
           </a:p>
@@ -2232,7 +2232,7 @@
           <a:p>
             <a:fld id="{1B31CA29-C2EB-451B-A0BB-9B4644E6EA20}" type="datetimeFigureOut">
               <a:rPr lang="en-US" smtClean="0"/>
-              <a:t>10/18/2025</a:t>
+              <a:t>10/19/2025</a:t>
             </a:fld>
             <a:endParaRPr lang="en-US"/>
           </a:p>
@@ -2644,7 +2644,7 @@
           <a:p>
             <a:fld id="{1B31CA29-C2EB-451B-A0BB-9B4644E6EA20}" type="datetimeFigureOut">
               <a:rPr lang="en-US" smtClean="0"/>
-              <a:t>10/18/2025</a:t>
+              <a:t>10/19/2025</a:t>
             </a:fld>
             <a:endParaRPr lang="en-US"/>
           </a:p>
@@ -2785,7 +2785,7 @@
           <a:p>
             <a:fld id="{1B31CA29-C2EB-451B-A0BB-9B4644E6EA20}" type="datetimeFigureOut">
               <a:rPr lang="en-US" smtClean="0"/>
-              <a:t>10/18/2025</a:t>
+              <a:t>10/19/2025</a:t>
             </a:fld>
             <a:endParaRPr lang="en-US"/>
           </a:p>
@@ -2898,7 +2898,7 @@
           <a:p>
             <a:fld id="{1B31CA29-C2EB-451B-A0BB-9B4644E6EA20}" type="datetimeFigureOut">
               <a:rPr lang="en-US" smtClean="0"/>
-              <a:t>10/18/2025</a:t>
+              <a:t>10/19/2025</a:t>
             </a:fld>
             <a:endParaRPr lang="en-US"/>
           </a:p>
@@ -3209,7 +3209,7 @@
           <a:p>
             <a:fld id="{1B31CA29-C2EB-451B-A0BB-9B4644E6EA20}" type="datetimeFigureOut">
               <a:rPr lang="en-US" smtClean="0"/>
-              <a:t>10/18/2025</a:t>
+              <a:t>10/19/2025</a:t>
             </a:fld>
             <a:endParaRPr lang="en-US"/>
           </a:p>
@@ -3497,7 +3497,7 @@
           <a:p>
             <a:fld id="{1B31CA29-C2EB-451B-A0BB-9B4644E6EA20}" type="datetimeFigureOut">
               <a:rPr lang="en-US" smtClean="0"/>
-              <a:t>10/18/2025</a:t>
+              <a:t>10/19/2025</a:t>
             </a:fld>
             <a:endParaRPr lang="en-US"/>
           </a:p>
@@ -3738,7 +3738,7 @@
           <a:p>
             <a:fld id="{1B31CA29-C2EB-451B-A0BB-9B4644E6EA20}" type="datetimeFigureOut">
               <a:rPr lang="en-US" smtClean="0"/>
-              <a:t>10/18/2025</a:t>
+              <a:t>10/19/2025</a:t>
             </a:fld>
             <a:endParaRPr lang="en-US"/>
           </a:p>

</xml_diff>

<commit_message>
created solution in a way that avoided large files
</commit_message>
<xml_diff>
--- a/resources/DataProcessingDocumentation.pptx
+++ b/resources/DataProcessingDocumentation.pptx
@@ -230,7 +230,7 @@
           <a:p>
             <a:fld id="{A0EDB7BB-2F45-498B-BAA5-C7C8A1082E91}" type="datetimeFigureOut">
               <a:rPr lang="en-US" smtClean="0"/>
-              <a:t>10/19/2025</a:t>
+              <a:t>12/17/2025</a:t>
             </a:fld>
             <a:endParaRPr lang="en-US"/>
           </a:p>
@@ -1088,7 +1088,7 @@
           <a:p>
             <a:fld id="{1B31CA29-C2EB-451B-A0BB-9B4644E6EA20}" type="datetimeFigureOut">
               <a:rPr lang="en-US" smtClean="0"/>
-              <a:t>10/19/2025</a:t>
+              <a:t>12/17/2025</a:t>
             </a:fld>
             <a:endParaRPr lang="en-US"/>
           </a:p>
@@ -1286,7 +1286,7 @@
           <a:p>
             <a:fld id="{1B31CA29-C2EB-451B-A0BB-9B4644E6EA20}" type="datetimeFigureOut">
               <a:rPr lang="en-US" smtClean="0"/>
-              <a:t>10/19/2025</a:t>
+              <a:t>12/17/2025</a:t>
             </a:fld>
             <a:endParaRPr lang="en-US"/>
           </a:p>
@@ -1494,7 +1494,7 @@
           <a:p>
             <a:fld id="{1B31CA29-C2EB-451B-A0BB-9B4644E6EA20}" type="datetimeFigureOut">
               <a:rPr lang="en-US" smtClean="0"/>
-              <a:t>10/19/2025</a:t>
+              <a:t>12/17/2025</a:t>
             </a:fld>
             <a:endParaRPr lang="en-US"/>
           </a:p>
@@ -1692,7 +1692,7 @@
           <a:p>
             <a:fld id="{1B31CA29-C2EB-451B-A0BB-9B4644E6EA20}" type="datetimeFigureOut">
               <a:rPr lang="en-US" smtClean="0"/>
-              <a:t>10/19/2025</a:t>
+              <a:t>12/17/2025</a:t>
             </a:fld>
             <a:endParaRPr lang="en-US"/>
           </a:p>
@@ -1967,7 +1967,7 @@
           <a:p>
             <a:fld id="{1B31CA29-C2EB-451B-A0BB-9B4644E6EA20}" type="datetimeFigureOut">
               <a:rPr lang="en-US" smtClean="0"/>
-              <a:t>10/19/2025</a:t>
+              <a:t>12/17/2025</a:t>
             </a:fld>
             <a:endParaRPr lang="en-US"/>
           </a:p>
@@ -2232,7 +2232,7 @@
           <a:p>
             <a:fld id="{1B31CA29-C2EB-451B-A0BB-9B4644E6EA20}" type="datetimeFigureOut">
               <a:rPr lang="en-US" smtClean="0"/>
-              <a:t>10/19/2025</a:t>
+              <a:t>12/17/2025</a:t>
             </a:fld>
             <a:endParaRPr lang="en-US"/>
           </a:p>
@@ -2644,7 +2644,7 @@
           <a:p>
             <a:fld id="{1B31CA29-C2EB-451B-A0BB-9B4644E6EA20}" type="datetimeFigureOut">
               <a:rPr lang="en-US" smtClean="0"/>
-              <a:t>10/19/2025</a:t>
+              <a:t>12/17/2025</a:t>
             </a:fld>
             <a:endParaRPr lang="en-US"/>
           </a:p>
@@ -2785,7 +2785,7 @@
           <a:p>
             <a:fld id="{1B31CA29-C2EB-451B-A0BB-9B4644E6EA20}" type="datetimeFigureOut">
               <a:rPr lang="en-US" smtClean="0"/>
-              <a:t>10/19/2025</a:t>
+              <a:t>12/17/2025</a:t>
             </a:fld>
             <a:endParaRPr lang="en-US"/>
           </a:p>
@@ -2898,7 +2898,7 @@
           <a:p>
             <a:fld id="{1B31CA29-C2EB-451B-A0BB-9B4644E6EA20}" type="datetimeFigureOut">
               <a:rPr lang="en-US" smtClean="0"/>
-              <a:t>10/19/2025</a:t>
+              <a:t>12/17/2025</a:t>
             </a:fld>
             <a:endParaRPr lang="en-US"/>
           </a:p>
@@ -3209,7 +3209,7 @@
           <a:p>
             <a:fld id="{1B31CA29-C2EB-451B-A0BB-9B4644E6EA20}" type="datetimeFigureOut">
               <a:rPr lang="en-US" smtClean="0"/>
-              <a:t>10/19/2025</a:t>
+              <a:t>12/17/2025</a:t>
             </a:fld>
             <a:endParaRPr lang="en-US"/>
           </a:p>
@@ -3497,7 +3497,7 @@
           <a:p>
             <a:fld id="{1B31CA29-C2EB-451B-A0BB-9B4644E6EA20}" type="datetimeFigureOut">
               <a:rPr lang="en-US" smtClean="0"/>
-              <a:t>10/19/2025</a:t>
+              <a:t>12/17/2025</a:t>
             </a:fld>
             <a:endParaRPr lang="en-US"/>
           </a:p>
@@ -3738,7 +3738,7 @@
           <a:p>
             <a:fld id="{1B31CA29-C2EB-451B-A0BB-9B4644E6EA20}" type="datetimeFigureOut">
               <a:rPr lang="en-US" smtClean="0"/>
-              <a:t>10/19/2025</a:t>
+              <a:t>12/17/2025</a:t>
             </a:fld>
             <a:endParaRPr lang="en-US"/>
           </a:p>
@@ -8151,7 +8151,7 @@
         <p:spPr>
           <a:xfrm>
             <a:off x="6215270" y="5883965"/>
-            <a:ext cx="4626138" cy="369332"/>
+            <a:ext cx="5646610" cy="369332"/>
           </a:xfrm>
           <a:prstGeom prst="rect">
             <a:avLst/>
@@ -8170,7 +8170,23 @@
                   <a:srgbClr val="FFFF00"/>
                 </a:highlight>
               </a:rPr>
-              <a:t>highlight means it is a customizable function</a:t>
+              <a:t>highlight means it is </a:t>
+            </a:r>
+            <a:r>
+              <a:rPr lang="en-US">
+                <a:highlight>
+                  <a:srgbClr val="FFFF00"/>
+                </a:highlight>
+              </a:rPr>
+              <a:t>a commonly customizable </a:t>
+            </a:r>
+            <a:r>
+              <a:rPr lang="en-US" dirty="0">
+                <a:highlight>
+                  <a:srgbClr val="FFFF00"/>
+                </a:highlight>
+              </a:rPr>
+              <a:t>function</a:t>
             </a:r>
           </a:p>
         </p:txBody>

</xml_diff>